<commit_message>
Update project06 - 파워포인트 종합 - 서희.pptx
</commit_message>
<xml_diff>
--- a/0 발표용 파워포인트/project06 - 파워포인트 종합 - 서희.pptx
+++ b/0 발표용 파워포인트/project06 - 파워포인트 종합 - 서희.pptx
@@ -115,7 +115,7 @@
   </p:defaultTextStyle>
   <p:extLst>
     <p:ext uri="{EFAFB233-063F-42B5-8137-9DF3F51BA10A}">
-      <p15:sldGuideLst xmlns="" xmlns:p15="http://schemas.microsoft.com/office/powerpoint/2012/main">
+      <p15:sldGuideLst xmlns:p15="http://schemas.microsoft.com/office/powerpoint/2012/main">
         <p15:guide id="1" orient="horz" pos="2160">
           <p15:clr>
             <a:srgbClr val="A4A3A4"/>
@@ -127,6 +127,20 @@
           </p15:clr>
         </p15:guide>
       </p15:sldGuideLst>
+    </p:ext>
+    <p:ext uri="{2D200454-40CA-4A62-9FC3-DE9A4176ACB9}">
+      <p15:notesGuideLst xmlns:p15="http://schemas.microsoft.com/office/powerpoint/2012/main">
+        <p15:guide id="1" orient="horz" pos="2880">
+          <p15:clr>
+            <a:srgbClr val="A4A3A4"/>
+          </p15:clr>
+        </p15:guide>
+        <p15:guide id="2" pos="2160">
+          <p15:clr>
+            <a:srgbClr val="A4A3A4"/>
+          </p15:clr>
+        </p15:guide>
+      </p15:notesGuideLst>
     </p:ext>
   </p:extLst>
 </p:presentation>
@@ -215,7 +229,7 @@
             <a:fld id="{EFE7F2A0-C7D9-4DBD-AE3B-C1A712DCE501}" type="datetimeFigureOut">
               <a:rPr lang="ko-KR" altLang="en-US" smtClean="0"/>
               <a:pPr/>
-              <a:t>2020-05-04</a:t>
+              <a:t>2020-05-05</a:t>
             </a:fld>
             <a:endParaRPr lang="ko-KR" altLang="en-US"/>
           </a:p>
@@ -281,38 +295,37 @@
           <a:p>
             <a:pPr lvl="0"/>
             <a:r>
-              <a:rPr lang="ko-KR" altLang="en-US" smtClean="0"/>
+              <a:rPr lang="ko-KR" altLang="en-US"/>
               <a:t>마스터 텍스트 스타일을 편집합니다</a:t>
             </a:r>
           </a:p>
           <a:p>
             <a:pPr lvl="1"/>
             <a:r>
-              <a:rPr lang="ko-KR" altLang="en-US" smtClean="0"/>
+              <a:rPr lang="ko-KR" altLang="en-US"/>
               <a:t>둘째 수준</a:t>
             </a:r>
           </a:p>
           <a:p>
             <a:pPr lvl="2"/>
             <a:r>
-              <a:rPr lang="ko-KR" altLang="en-US" smtClean="0"/>
+              <a:rPr lang="ko-KR" altLang="en-US"/>
               <a:t>셋째 수준</a:t>
             </a:r>
           </a:p>
           <a:p>
             <a:pPr lvl="3"/>
             <a:r>
-              <a:rPr lang="ko-KR" altLang="en-US" smtClean="0"/>
+              <a:rPr lang="ko-KR" altLang="en-US"/>
               <a:t>넷째 수준</a:t>
             </a:r>
           </a:p>
           <a:p>
             <a:pPr lvl="4"/>
             <a:r>
-              <a:rPr lang="ko-KR" altLang="en-US" smtClean="0"/>
+              <a:rPr lang="ko-KR" altLang="en-US"/>
               <a:t>다섯째 수준</a:t>
             </a:r>
-            <a:endParaRPr lang="ko-KR" altLang="en-US"/>
           </a:p>
         </p:txBody>
       </p:sp>
@@ -632,10 +645,9 @@
           </a:lstStyle>
           <a:p>
             <a:r>
-              <a:rPr lang="ko-KR" altLang="en-US" smtClean="0"/>
+              <a:rPr lang="ko-KR" altLang="en-US"/>
               <a:t>마스터 제목 스타일 편집</a:t>
             </a:r>
-            <a:endParaRPr lang="ko-KR" altLang="en-US"/>
           </a:p>
         </p:txBody>
       </p:sp>
@@ -697,10 +709,9 @@
           </a:lstStyle>
           <a:p>
             <a:r>
-              <a:rPr lang="ko-KR" altLang="en-US" smtClean="0"/>
+              <a:rPr lang="ko-KR" altLang="en-US"/>
               <a:t>마스터 부제목 스타일 편집</a:t>
             </a:r>
-            <a:endParaRPr lang="ko-KR" altLang="en-US"/>
           </a:p>
         </p:txBody>
       </p:sp>
@@ -722,7 +733,7 @@
             <a:fld id="{272C3D53-FEDF-49EC-8F65-FFFC138B637E}" type="datetimeFigureOut">
               <a:rPr lang="ko-KR" altLang="en-US" smtClean="0"/>
               <a:pPr/>
-              <a:t>2020-05-04</a:t>
+              <a:t>2020-05-05</a:t>
             </a:fld>
             <a:endParaRPr lang="ko-KR" altLang="en-US"/>
           </a:p>
@@ -817,10 +828,9 @@
           <a:lstStyle/>
           <a:p>
             <a:r>
-              <a:rPr lang="ko-KR" altLang="en-US" smtClean="0"/>
+              <a:rPr lang="ko-KR" altLang="en-US"/>
               <a:t>마스터 제목 스타일 편집</a:t>
             </a:r>
-            <a:endParaRPr lang="ko-KR" altLang="en-US"/>
           </a:p>
         </p:txBody>
       </p:sp>
@@ -841,38 +851,37 @@
           <a:p>
             <a:pPr lvl="0"/>
             <a:r>
-              <a:rPr lang="ko-KR" altLang="en-US" smtClean="0"/>
+              <a:rPr lang="ko-KR" altLang="en-US"/>
               <a:t>마스터 텍스트 스타일을 편집합니다</a:t>
             </a:r>
           </a:p>
           <a:p>
             <a:pPr lvl="1"/>
             <a:r>
-              <a:rPr lang="ko-KR" altLang="en-US" smtClean="0"/>
+              <a:rPr lang="ko-KR" altLang="en-US"/>
               <a:t>둘째 수준</a:t>
             </a:r>
           </a:p>
           <a:p>
             <a:pPr lvl="2"/>
             <a:r>
-              <a:rPr lang="ko-KR" altLang="en-US" smtClean="0"/>
+              <a:rPr lang="ko-KR" altLang="en-US"/>
               <a:t>셋째 수준</a:t>
             </a:r>
           </a:p>
           <a:p>
             <a:pPr lvl="3"/>
             <a:r>
-              <a:rPr lang="ko-KR" altLang="en-US" smtClean="0"/>
+              <a:rPr lang="ko-KR" altLang="en-US"/>
               <a:t>넷째 수준</a:t>
             </a:r>
           </a:p>
           <a:p>
             <a:pPr lvl="4"/>
             <a:r>
-              <a:rPr lang="ko-KR" altLang="en-US" smtClean="0"/>
+              <a:rPr lang="ko-KR" altLang="en-US"/>
               <a:t>다섯째 수준</a:t>
             </a:r>
-            <a:endParaRPr lang="ko-KR" altLang="en-US"/>
           </a:p>
         </p:txBody>
       </p:sp>
@@ -894,7 +903,7 @@
             <a:fld id="{272C3D53-FEDF-49EC-8F65-FFFC138B637E}" type="datetimeFigureOut">
               <a:rPr lang="ko-KR" altLang="en-US" smtClean="0"/>
               <a:pPr/>
-              <a:t>2020-05-04</a:t>
+              <a:t>2020-05-05</a:t>
             </a:fld>
             <a:endParaRPr lang="ko-KR" altLang="en-US"/>
           </a:p>
@@ -994,10 +1003,9 @@
           <a:lstStyle/>
           <a:p>
             <a:r>
-              <a:rPr lang="ko-KR" altLang="en-US" smtClean="0"/>
+              <a:rPr lang="ko-KR" altLang="en-US"/>
               <a:t>마스터 제목 스타일 편집</a:t>
             </a:r>
-            <a:endParaRPr lang="ko-KR" altLang="en-US"/>
           </a:p>
         </p:txBody>
       </p:sp>
@@ -1023,38 +1031,37 @@
           <a:p>
             <a:pPr lvl="0"/>
             <a:r>
-              <a:rPr lang="ko-KR" altLang="en-US" smtClean="0"/>
+              <a:rPr lang="ko-KR" altLang="en-US"/>
               <a:t>마스터 텍스트 스타일을 편집합니다</a:t>
             </a:r>
           </a:p>
           <a:p>
             <a:pPr lvl="1"/>
             <a:r>
-              <a:rPr lang="ko-KR" altLang="en-US" smtClean="0"/>
+              <a:rPr lang="ko-KR" altLang="en-US"/>
               <a:t>둘째 수준</a:t>
             </a:r>
           </a:p>
           <a:p>
             <a:pPr lvl="2"/>
             <a:r>
-              <a:rPr lang="ko-KR" altLang="en-US" smtClean="0"/>
+              <a:rPr lang="ko-KR" altLang="en-US"/>
               <a:t>셋째 수준</a:t>
             </a:r>
           </a:p>
           <a:p>
             <a:pPr lvl="3"/>
             <a:r>
-              <a:rPr lang="ko-KR" altLang="en-US" smtClean="0"/>
+              <a:rPr lang="ko-KR" altLang="en-US"/>
               <a:t>넷째 수준</a:t>
             </a:r>
           </a:p>
           <a:p>
             <a:pPr lvl="4"/>
             <a:r>
-              <a:rPr lang="ko-KR" altLang="en-US" smtClean="0"/>
+              <a:rPr lang="ko-KR" altLang="en-US"/>
               <a:t>다섯째 수준</a:t>
             </a:r>
-            <a:endParaRPr lang="ko-KR" altLang="en-US"/>
           </a:p>
         </p:txBody>
       </p:sp>
@@ -1076,7 +1083,7 @@
             <a:fld id="{272C3D53-FEDF-49EC-8F65-FFFC138B637E}" type="datetimeFigureOut">
               <a:rPr lang="ko-KR" altLang="en-US" smtClean="0"/>
               <a:pPr/>
-              <a:t>2020-05-04</a:t>
+              <a:t>2020-05-05</a:t>
             </a:fld>
             <a:endParaRPr lang="ko-KR" altLang="en-US"/>
           </a:p>
@@ -1369,10 +1376,9 @@
           <a:lstStyle/>
           <a:p>
             <a:r>
-              <a:rPr lang="ko-KR" altLang="en-US" smtClean="0"/>
+              <a:rPr lang="ko-KR" altLang="en-US"/>
               <a:t>마스터 제목 스타일 편집</a:t>
             </a:r>
-            <a:endParaRPr lang="ko-KR" altLang="en-US"/>
           </a:p>
         </p:txBody>
       </p:sp>
@@ -1393,38 +1399,37 @@
           <a:p>
             <a:pPr lvl="0"/>
             <a:r>
-              <a:rPr lang="ko-KR" altLang="en-US" smtClean="0"/>
+              <a:rPr lang="ko-KR" altLang="en-US"/>
               <a:t>마스터 텍스트 스타일을 편집합니다</a:t>
             </a:r>
           </a:p>
           <a:p>
             <a:pPr lvl="1"/>
             <a:r>
-              <a:rPr lang="ko-KR" altLang="en-US" smtClean="0"/>
+              <a:rPr lang="ko-KR" altLang="en-US"/>
               <a:t>둘째 수준</a:t>
             </a:r>
           </a:p>
           <a:p>
             <a:pPr lvl="2"/>
             <a:r>
-              <a:rPr lang="ko-KR" altLang="en-US" smtClean="0"/>
+              <a:rPr lang="ko-KR" altLang="en-US"/>
               <a:t>셋째 수준</a:t>
             </a:r>
           </a:p>
           <a:p>
             <a:pPr lvl="3"/>
             <a:r>
-              <a:rPr lang="ko-KR" altLang="en-US" smtClean="0"/>
+              <a:rPr lang="ko-KR" altLang="en-US"/>
               <a:t>넷째 수준</a:t>
             </a:r>
           </a:p>
           <a:p>
             <a:pPr lvl="4"/>
             <a:r>
-              <a:rPr lang="ko-KR" altLang="en-US" smtClean="0"/>
+              <a:rPr lang="ko-KR" altLang="en-US"/>
               <a:t>다섯째 수준</a:t>
             </a:r>
-            <a:endParaRPr lang="ko-KR" altLang="en-US"/>
           </a:p>
         </p:txBody>
       </p:sp>
@@ -1446,7 +1451,7 @@
             <a:fld id="{272C3D53-FEDF-49EC-8F65-FFFC138B637E}" type="datetimeFigureOut">
               <a:rPr lang="ko-KR" altLang="en-US" smtClean="0"/>
               <a:pPr/>
-              <a:t>2020-05-04</a:t>
+              <a:t>2020-05-05</a:t>
             </a:fld>
             <a:endParaRPr lang="ko-KR" altLang="en-US"/>
           </a:p>
@@ -1505,13 +1510,6 @@
   <p:clrMapOvr>
     <a:masterClrMapping/>
   </p:clrMapOvr>
-  <p:timing>
-    <p:tnLst>
-      <p:par>
-        <p:cTn id="1" dur="indefinite" restart="never" nodeType="tmRoot"/>
-      </p:par>
-    </p:tnLst>
-  </p:timing>
 </p:sldLayout>
 </file>
 
@@ -1557,10 +1555,9 @@
           </a:lstStyle>
           <a:p>
             <a:r>
-              <a:rPr lang="ko-KR" altLang="en-US" smtClean="0"/>
+              <a:rPr lang="ko-KR" altLang="en-US"/>
               <a:t>마스터 제목 스타일 편집</a:t>
             </a:r>
-            <a:endParaRPr lang="ko-KR" altLang="en-US"/>
           </a:p>
         </p:txBody>
       </p:sp>
@@ -1677,7 +1674,7 @@
           <a:p>
             <a:pPr lvl="0"/>
             <a:r>
-              <a:rPr lang="ko-KR" altLang="en-US" smtClean="0"/>
+              <a:rPr lang="ko-KR" altLang="en-US"/>
               <a:t>마스터 텍스트 스타일을 편집합니다</a:t>
             </a:r>
           </a:p>
@@ -1701,7 +1698,7 @@
             <a:fld id="{272C3D53-FEDF-49EC-8F65-FFFC138B637E}" type="datetimeFigureOut">
               <a:rPr lang="ko-KR" altLang="en-US" smtClean="0"/>
               <a:pPr/>
-              <a:t>2020-05-04</a:t>
+              <a:t>2020-05-05</a:t>
             </a:fld>
             <a:endParaRPr lang="ko-KR" altLang="en-US"/>
           </a:p>
@@ -1796,10 +1793,9 @@
           <a:lstStyle/>
           <a:p>
             <a:r>
-              <a:rPr lang="ko-KR" altLang="en-US" smtClean="0"/>
+              <a:rPr lang="ko-KR" altLang="en-US"/>
               <a:t>마스터 제목 스타일 편집</a:t>
             </a:r>
-            <a:endParaRPr lang="ko-KR" altLang="en-US"/>
           </a:p>
         </p:txBody>
       </p:sp>
@@ -1825,38 +1821,37 @@
           <a:p>
             <a:pPr lvl="0"/>
             <a:r>
-              <a:rPr lang="ko-KR" altLang="en-US" smtClean="0"/>
+              <a:rPr lang="ko-KR" altLang="en-US"/>
               <a:t>마스터 텍스트 스타일을 편집합니다</a:t>
             </a:r>
           </a:p>
           <a:p>
             <a:pPr lvl="1"/>
             <a:r>
-              <a:rPr lang="ko-KR" altLang="en-US" smtClean="0"/>
+              <a:rPr lang="ko-KR" altLang="en-US"/>
               <a:t>둘째 수준</a:t>
             </a:r>
           </a:p>
           <a:p>
             <a:pPr lvl="2"/>
             <a:r>
-              <a:rPr lang="ko-KR" altLang="en-US" smtClean="0"/>
+              <a:rPr lang="ko-KR" altLang="en-US"/>
               <a:t>셋째 수준</a:t>
             </a:r>
           </a:p>
           <a:p>
             <a:pPr lvl="3"/>
             <a:r>
-              <a:rPr lang="ko-KR" altLang="en-US" smtClean="0"/>
+              <a:rPr lang="ko-KR" altLang="en-US"/>
               <a:t>넷째 수준</a:t>
             </a:r>
           </a:p>
           <a:p>
             <a:pPr lvl="4"/>
             <a:r>
-              <a:rPr lang="ko-KR" altLang="en-US" smtClean="0"/>
+              <a:rPr lang="ko-KR" altLang="en-US"/>
               <a:t>다섯째 수준</a:t>
             </a:r>
-            <a:endParaRPr lang="ko-KR" altLang="en-US"/>
           </a:p>
         </p:txBody>
       </p:sp>
@@ -1882,38 +1877,37 @@
           <a:p>
             <a:pPr lvl="0"/>
             <a:r>
-              <a:rPr lang="ko-KR" altLang="en-US" smtClean="0"/>
+              <a:rPr lang="ko-KR" altLang="en-US"/>
               <a:t>마스터 텍스트 스타일을 편집합니다</a:t>
             </a:r>
           </a:p>
           <a:p>
             <a:pPr lvl="1"/>
             <a:r>
-              <a:rPr lang="ko-KR" altLang="en-US" smtClean="0"/>
+              <a:rPr lang="ko-KR" altLang="en-US"/>
               <a:t>둘째 수준</a:t>
             </a:r>
           </a:p>
           <a:p>
             <a:pPr lvl="2"/>
             <a:r>
-              <a:rPr lang="ko-KR" altLang="en-US" smtClean="0"/>
+              <a:rPr lang="ko-KR" altLang="en-US"/>
               <a:t>셋째 수준</a:t>
             </a:r>
           </a:p>
           <a:p>
             <a:pPr lvl="3"/>
             <a:r>
-              <a:rPr lang="ko-KR" altLang="en-US" smtClean="0"/>
+              <a:rPr lang="ko-KR" altLang="en-US"/>
               <a:t>넷째 수준</a:t>
             </a:r>
           </a:p>
           <a:p>
             <a:pPr lvl="4"/>
             <a:r>
-              <a:rPr lang="ko-KR" altLang="en-US" smtClean="0"/>
+              <a:rPr lang="ko-KR" altLang="en-US"/>
               <a:t>다섯째 수준</a:t>
             </a:r>
-            <a:endParaRPr lang="ko-KR" altLang="en-US"/>
           </a:p>
         </p:txBody>
       </p:sp>
@@ -1935,7 +1929,7 @@
             <a:fld id="{272C3D53-FEDF-49EC-8F65-FFFC138B637E}" type="datetimeFigureOut">
               <a:rPr lang="ko-KR" altLang="en-US" smtClean="0"/>
               <a:pPr/>
-              <a:t>2020-05-04</a:t>
+              <a:t>2020-05-05</a:t>
             </a:fld>
             <a:endParaRPr lang="ko-KR" altLang="en-US"/>
           </a:p>
@@ -2035,10 +2029,9 @@
           <a:lstStyle/>
           <a:p>
             <a:r>
-              <a:rPr lang="ko-KR" altLang="en-US" smtClean="0"/>
+              <a:rPr lang="ko-KR" altLang="en-US"/>
               <a:t>마스터 제목 스타일 편집</a:t>
             </a:r>
-            <a:endParaRPr lang="ko-KR" altLang="en-US"/>
           </a:p>
         </p:txBody>
       </p:sp>
@@ -2101,7 +2094,7 @@
           <a:p>
             <a:pPr lvl="0"/>
             <a:r>
-              <a:rPr lang="ko-KR" altLang="en-US" smtClean="0"/>
+              <a:rPr lang="ko-KR" altLang="en-US"/>
               <a:t>마스터 텍스트 스타일을 편집합니다</a:t>
             </a:r>
           </a:p>
@@ -2129,38 +2122,37 @@
           <a:p>
             <a:pPr lvl="0"/>
             <a:r>
-              <a:rPr lang="ko-KR" altLang="en-US" smtClean="0"/>
+              <a:rPr lang="ko-KR" altLang="en-US"/>
               <a:t>마스터 텍스트 스타일을 편집합니다</a:t>
             </a:r>
           </a:p>
           <a:p>
             <a:pPr lvl="1"/>
             <a:r>
-              <a:rPr lang="ko-KR" altLang="en-US" smtClean="0"/>
+              <a:rPr lang="ko-KR" altLang="en-US"/>
               <a:t>둘째 수준</a:t>
             </a:r>
           </a:p>
           <a:p>
             <a:pPr lvl="2"/>
             <a:r>
-              <a:rPr lang="ko-KR" altLang="en-US" smtClean="0"/>
+              <a:rPr lang="ko-KR" altLang="en-US"/>
               <a:t>셋째 수준</a:t>
             </a:r>
           </a:p>
           <a:p>
             <a:pPr lvl="3"/>
             <a:r>
-              <a:rPr lang="ko-KR" altLang="en-US" smtClean="0"/>
+              <a:rPr lang="ko-KR" altLang="en-US"/>
               <a:t>넷째 수준</a:t>
             </a:r>
           </a:p>
           <a:p>
             <a:pPr lvl="4"/>
             <a:r>
-              <a:rPr lang="ko-KR" altLang="en-US" smtClean="0"/>
+              <a:rPr lang="ko-KR" altLang="en-US"/>
               <a:t>다섯째 수준</a:t>
             </a:r>
-            <a:endParaRPr lang="ko-KR" altLang="en-US"/>
           </a:p>
         </p:txBody>
       </p:sp>
@@ -2223,7 +2215,7 @@
           <a:p>
             <a:pPr lvl="0"/>
             <a:r>
-              <a:rPr lang="ko-KR" altLang="en-US" smtClean="0"/>
+              <a:rPr lang="ko-KR" altLang="en-US"/>
               <a:t>마스터 텍스트 스타일을 편집합니다</a:t>
             </a:r>
           </a:p>
@@ -2251,38 +2243,37 @@
           <a:p>
             <a:pPr lvl="0"/>
             <a:r>
-              <a:rPr lang="ko-KR" altLang="en-US" smtClean="0"/>
+              <a:rPr lang="ko-KR" altLang="en-US"/>
               <a:t>마스터 텍스트 스타일을 편집합니다</a:t>
             </a:r>
           </a:p>
           <a:p>
             <a:pPr lvl="1"/>
             <a:r>
-              <a:rPr lang="ko-KR" altLang="en-US" smtClean="0"/>
+              <a:rPr lang="ko-KR" altLang="en-US"/>
               <a:t>둘째 수준</a:t>
             </a:r>
           </a:p>
           <a:p>
             <a:pPr lvl="2"/>
             <a:r>
-              <a:rPr lang="ko-KR" altLang="en-US" smtClean="0"/>
+              <a:rPr lang="ko-KR" altLang="en-US"/>
               <a:t>셋째 수준</a:t>
             </a:r>
           </a:p>
           <a:p>
             <a:pPr lvl="3"/>
             <a:r>
-              <a:rPr lang="ko-KR" altLang="en-US" smtClean="0"/>
+              <a:rPr lang="ko-KR" altLang="en-US"/>
               <a:t>넷째 수준</a:t>
             </a:r>
           </a:p>
           <a:p>
             <a:pPr lvl="4"/>
             <a:r>
-              <a:rPr lang="ko-KR" altLang="en-US" smtClean="0"/>
+              <a:rPr lang="ko-KR" altLang="en-US"/>
               <a:t>다섯째 수준</a:t>
             </a:r>
-            <a:endParaRPr lang="ko-KR" altLang="en-US"/>
           </a:p>
         </p:txBody>
       </p:sp>
@@ -2304,7 +2295,7 @@
             <a:fld id="{272C3D53-FEDF-49EC-8F65-FFFC138B637E}" type="datetimeFigureOut">
               <a:rPr lang="ko-KR" altLang="en-US" smtClean="0"/>
               <a:pPr/>
-              <a:t>2020-05-04</a:t>
+              <a:t>2020-05-05</a:t>
             </a:fld>
             <a:endParaRPr lang="ko-KR" altLang="en-US"/>
           </a:p>
@@ -2399,10 +2390,9 @@
           <a:lstStyle/>
           <a:p>
             <a:r>
-              <a:rPr lang="ko-KR" altLang="en-US" smtClean="0"/>
+              <a:rPr lang="ko-KR" altLang="en-US"/>
               <a:t>마스터 제목 스타일 편집</a:t>
             </a:r>
-            <a:endParaRPr lang="ko-KR" altLang="en-US"/>
           </a:p>
         </p:txBody>
       </p:sp>
@@ -2424,7 +2414,7 @@
             <a:fld id="{272C3D53-FEDF-49EC-8F65-FFFC138B637E}" type="datetimeFigureOut">
               <a:rPr lang="ko-KR" altLang="en-US" smtClean="0"/>
               <a:pPr/>
-              <a:t>2020-05-04</a:t>
+              <a:t>2020-05-05</a:t>
             </a:fld>
             <a:endParaRPr lang="ko-KR" altLang="en-US"/>
           </a:p>
@@ -2521,7 +2511,7 @@
             <a:fld id="{272C3D53-FEDF-49EC-8F65-FFFC138B637E}" type="datetimeFigureOut">
               <a:rPr lang="ko-KR" altLang="en-US" smtClean="0"/>
               <a:pPr/>
-              <a:t>2020-05-04</a:t>
+              <a:t>2020-05-05</a:t>
             </a:fld>
             <a:endParaRPr lang="ko-KR" altLang="en-US"/>
           </a:p>
@@ -2625,10 +2615,9 @@
           </a:lstStyle>
           <a:p>
             <a:r>
-              <a:rPr lang="ko-KR" altLang="en-US" smtClean="0"/>
+              <a:rPr lang="ko-KR" altLang="en-US"/>
               <a:t>마스터 제목 스타일 편집</a:t>
             </a:r>
-            <a:endParaRPr lang="ko-KR" altLang="en-US"/>
           </a:p>
         </p:txBody>
       </p:sp>
@@ -2682,38 +2671,37 @@
           <a:p>
             <a:pPr lvl="0"/>
             <a:r>
-              <a:rPr lang="ko-KR" altLang="en-US" smtClean="0"/>
+              <a:rPr lang="ko-KR" altLang="en-US"/>
               <a:t>마스터 텍스트 스타일을 편집합니다</a:t>
             </a:r>
           </a:p>
           <a:p>
             <a:pPr lvl="1"/>
             <a:r>
-              <a:rPr lang="ko-KR" altLang="en-US" smtClean="0"/>
+              <a:rPr lang="ko-KR" altLang="en-US"/>
               <a:t>둘째 수준</a:t>
             </a:r>
           </a:p>
           <a:p>
             <a:pPr lvl="2"/>
             <a:r>
-              <a:rPr lang="ko-KR" altLang="en-US" smtClean="0"/>
+              <a:rPr lang="ko-KR" altLang="en-US"/>
               <a:t>셋째 수준</a:t>
             </a:r>
           </a:p>
           <a:p>
             <a:pPr lvl="3"/>
             <a:r>
-              <a:rPr lang="ko-KR" altLang="en-US" smtClean="0"/>
+              <a:rPr lang="ko-KR" altLang="en-US"/>
               <a:t>넷째 수준</a:t>
             </a:r>
           </a:p>
           <a:p>
             <a:pPr lvl="4"/>
             <a:r>
-              <a:rPr lang="ko-KR" altLang="en-US" smtClean="0"/>
+              <a:rPr lang="ko-KR" altLang="en-US"/>
               <a:t>다섯째 수준</a:t>
             </a:r>
-            <a:endParaRPr lang="ko-KR" altLang="en-US"/>
           </a:p>
         </p:txBody>
       </p:sp>
@@ -2776,7 +2764,7 @@
           <a:p>
             <a:pPr lvl="0"/>
             <a:r>
-              <a:rPr lang="ko-KR" altLang="en-US" smtClean="0"/>
+              <a:rPr lang="ko-KR" altLang="en-US"/>
               <a:t>마스터 텍스트 스타일을 편집합니다</a:t>
             </a:r>
           </a:p>
@@ -2800,7 +2788,7 @@
             <a:fld id="{272C3D53-FEDF-49EC-8F65-FFFC138B637E}" type="datetimeFigureOut">
               <a:rPr lang="ko-KR" altLang="en-US" smtClean="0"/>
               <a:pPr/>
-              <a:t>2020-05-04</a:t>
+              <a:t>2020-05-05</a:t>
             </a:fld>
             <a:endParaRPr lang="ko-KR" altLang="en-US"/>
           </a:p>
@@ -2904,10 +2892,9 @@
           </a:lstStyle>
           <a:p>
             <a:r>
-              <a:rPr lang="ko-KR" altLang="en-US" smtClean="0"/>
+              <a:rPr lang="ko-KR" altLang="en-US"/>
               <a:t>마스터 제목 스타일 편집</a:t>
             </a:r>
-            <a:endParaRPr lang="ko-KR" altLang="en-US"/>
           </a:p>
         </p:txBody>
       </p:sp>
@@ -3031,7 +3018,7 @@
           <a:p>
             <a:pPr lvl="0"/>
             <a:r>
-              <a:rPr lang="ko-KR" altLang="en-US" smtClean="0"/>
+              <a:rPr lang="ko-KR" altLang="en-US"/>
               <a:t>마스터 텍스트 스타일을 편집합니다</a:t>
             </a:r>
           </a:p>
@@ -3055,7 +3042,7 @@
             <a:fld id="{272C3D53-FEDF-49EC-8F65-FFFC138B637E}" type="datetimeFigureOut">
               <a:rPr lang="ko-KR" altLang="en-US" smtClean="0"/>
               <a:pPr/>
-              <a:t>2020-05-04</a:t>
+              <a:t>2020-05-05</a:t>
             </a:fld>
             <a:endParaRPr lang="ko-KR" altLang="en-US"/>
           </a:p>
@@ -3168,10 +3155,9 @@
           <a:lstStyle/>
           <a:p>
             <a:r>
-              <a:rPr lang="ko-KR" altLang="en-US" smtClean="0"/>
+              <a:rPr lang="ko-KR" altLang="en-US"/>
               <a:t>마스터 제목 스타일 편집</a:t>
             </a:r>
-            <a:endParaRPr lang="ko-KR" altLang="en-US"/>
           </a:p>
         </p:txBody>
       </p:sp>
@@ -3202,38 +3188,37 @@
           <a:p>
             <a:pPr lvl="0"/>
             <a:r>
-              <a:rPr lang="ko-KR" altLang="en-US" smtClean="0"/>
+              <a:rPr lang="ko-KR" altLang="en-US"/>
               <a:t>마스터 텍스트 스타일을 편집합니다</a:t>
             </a:r>
           </a:p>
           <a:p>
             <a:pPr lvl="1"/>
             <a:r>
-              <a:rPr lang="ko-KR" altLang="en-US" smtClean="0"/>
+              <a:rPr lang="ko-KR" altLang="en-US"/>
               <a:t>둘째 수준</a:t>
             </a:r>
           </a:p>
           <a:p>
             <a:pPr lvl="2"/>
             <a:r>
-              <a:rPr lang="ko-KR" altLang="en-US" smtClean="0"/>
+              <a:rPr lang="ko-KR" altLang="en-US"/>
               <a:t>셋째 수준</a:t>
             </a:r>
           </a:p>
           <a:p>
             <a:pPr lvl="3"/>
             <a:r>
-              <a:rPr lang="ko-KR" altLang="en-US" smtClean="0"/>
+              <a:rPr lang="ko-KR" altLang="en-US"/>
               <a:t>넷째 수준</a:t>
             </a:r>
           </a:p>
           <a:p>
             <a:pPr lvl="4"/>
             <a:r>
-              <a:rPr lang="ko-KR" altLang="en-US" smtClean="0"/>
+              <a:rPr lang="ko-KR" altLang="en-US"/>
               <a:t>다섯째 수준</a:t>
             </a:r>
-            <a:endParaRPr lang="ko-KR" altLang="en-US"/>
           </a:p>
         </p:txBody>
       </p:sp>
@@ -3273,7 +3258,7 @@
             <a:fld id="{272C3D53-FEDF-49EC-8F65-FFFC138B637E}" type="datetimeFigureOut">
               <a:rPr lang="ko-KR" altLang="en-US" smtClean="0"/>
               <a:pPr/>
-              <a:t>2020-05-04</a:t>
+              <a:t>2020-05-05</a:t>
             </a:fld>
             <a:endParaRPr lang="ko-KR" altLang="en-US"/>
           </a:p>
@@ -3380,13 +3365,6 @@
     <p:sldLayoutId id="2147483659" r:id="rId11"/>
     <p:sldLayoutId id="2147483660" r:id="rId12"/>
   </p:sldLayoutIdLst>
-  <p:timing>
-    <p:tnLst>
-      <p:par>
-        <p:cTn id="1" dur="indefinite" restart="never" nodeType="tmRoot"/>
-      </p:par>
-    </p:tnLst>
-  </p:timing>
   <p:txStyles>
     <p:titleStyle>
       <a:lvl1pPr algn="l" defTabSz="914400" rtl="0" eaLnBrk="1" latinLnBrk="1" hangingPunct="1">
@@ -3727,16 +3705,6 @@
               </a:rPr>
               <a:t>화면설계 및 구현</a:t>
             </a:r>
-            <a:r>
-              <a:rPr lang="en-US" altLang="ko-KR" sz="5300" dirty="0">
-                <a:solidFill>
-                  <a:srgbClr val="FF9E00"/>
-                </a:solidFill>
-                <a:latin typeface="나눔바른고딕" panose="020B0603020101020101" pitchFamily="50" charset="-127"/>
-                <a:ea typeface="나눔바른고딕" panose="020B0603020101020101" pitchFamily="50" charset="-127"/>
-              </a:rPr>
-              <a:t/>
-            </a:r>
             <a:br>
               <a:rPr lang="en-US" altLang="ko-KR" sz="5300" dirty="0">
                 <a:solidFill>
@@ -3746,16 +3714,6 @@
                 <a:ea typeface="나눔바른고딕" panose="020B0603020101020101" pitchFamily="50" charset="-127"/>
               </a:rPr>
             </a:br>
-            <a:r>
-              <a:rPr lang="en-US" altLang="ko-KR" sz="5300" dirty="0">
-                <a:solidFill>
-                  <a:srgbClr val="FF9E00"/>
-                </a:solidFill>
-                <a:latin typeface="나눔바른고딕" panose="020B0603020101020101" pitchFamily="50" charset="-127"/>
-                <a:ea typeface="나눔바른고딕" panose="020B0603020101020101" pitchFamily="50" charset="-127"/>
-              </a:rPr>
-              <a:t/>
-            </a:r>
             <a:br>
               <a:rPr lang="en-US" altLang="ko-KR" sz="5300" dirty="0">
                 <a:solidFill>
@@ -4417,13 +4375,6 @@
   <p:clrMapOvr>
     <a:masterClrMapping/>
   </p:clrMapOvr>
-  <p:timing>
-    <p:tnLst>
-      <p:par>
-        <p:cTn id="1" dur="indefinite" restart="never" nodeType="tmRoot"/>
-      </p:par>
-    </p:tnLst>
-  </p:timing>
 </p:sld>
 </file>
 
@@ -5326,23 +5277,10 @@
                 <a:latin typeface="+mj-ea"/>
                 <a:ea typeface="+mj-ea"/>
               </a:rPr>
-              <a:t>-</a:t>
+              <a:t>- </a:t>
             </a:r>
             <a:r>
-              <a:rPr lang="en-US" altLang="ko-KR" sz="2400" b="1" dirty="0" smtClean="0">
-                <a:solidFill>
-                  <a:schemeClr val="tx1">
-                    <a:lumMod val="75000"/>
-                    <a:lumOff val="25000"/>
-                  </a:schemeClr>
-                </a:solidFill>
-                <a:latin typeface="+mj-ea"/>
-                <a:ea typeface="+mj-ea"/>
-              </a:rPr>
-              <a:t> </a:t>
-            </a:r>
-            <a:r>
-              <a:rPr lang="ko-KR" altLang="en-US" sz="2400" b="1" dirty="0" err="1" smtClean="0">
+              <a:rPr lang="ko-KR" altLang="en-US" sz="2400" b="1" dirty="0" err="1">
                 <a:solidFill>
                   <a:schemeClr val="tx1">
                     <a:lumMod val="75000"/>
@@ -5355,7 +5293,7 @@
               <a:t>마이페이지</a:t>
             </a:r>
             <a:r>
-              <a:rPr lang="ko-KR" altLang="en-US" sz="2400" b="1" dirty="0" smtClean="0">
+              <a:rPr lang="ko-KR" altLang="en-US" sz="2400" b="1" dirty="0">
                 <a:solidFill>
                   <a:schemeClr val="tx1">
                     <a:lumMod val="75000"/>
@@ -5378,23 +5316,10 @@
                 <a:latin typeface="+mj-ea"/>
                 <a:ea typeface="+mj-ea"/>
               </a:rPr>
-              <a:t>-</a:t>
+              <a:t>- </a:t>
             </a:r>
             <a:r>
-              <a:rPr lang="en-US" altLang="ko-KR" sz="2400" b="1" dirty="0" smtClean="0">
-                <a:solidFill>
-                  <a:schemeClr val="tx1">
-                    <a:lumMod val="75000"/>
-                    <a:lumOff val="25000"/>
-                  </a:schemeClr>
-                </a:solidFill>
-                <a:latin typeface="+mj-ea"/>
-                <a:ea typeface="+mj-ea"/>
-              </a:rPr>
-              <a:t> </a:t>
-            </a:r>
-            <a:r>
-              <a:rPr lang="ko-KR" altLang="en-US" b="1" dirty="0" smtClean="0">
+              <a:rPr lang="ko-KR" altLang="en-US" b="1" dirty="0">
                 <a:solidFill>
                   <a:schemeClr val="tx1">
                     <a:lumMod val="75000"/>
@@ -5407,7 +5332,7 @@
               <a:t>관심프로젝트</a:t>
             </a:r>
             <a:r>
-              <a:rPr lang="en-US" altLang="ko-KR" b="1" dirty="0" smtClean="0">
+              <a:rPr lang="en-US" altLang="ko-KR" b="1" dirty="0">
                 <a:solidFill>
                   <a:schemeClr val="tx1">
                     <a:lumMod val="75000"/>
@@ -5420,7 +5345,7 @@
               <a:t>, </a:t>
             </a:r>
             <a:r>
-              <a:rPr lang="ko-KR" altLang="en-US" b="1" dirty="0" smtClean="0">
+              <a:rPr lang="ko-KR" altLang="en-US" b="1" dirty="0">
                 <a:solidFill>
                   <a:schemeClr val="tx1">
                     <a:lumMod val="75000"/>
@@ -5433,7 +5358,7 @@
               <a:t>나의 </a:t>
             </a:r>
             <a:r>
-              <a:rPr lang="ko-KR" altLang="en-US" b="1" dirty="0" err="1" smtClean="0">
+              <a:rPr lang="ko-KR" altLang="en-US" b="1" dirty="0" err="1">
                 <a:solidFill>
                   <a:schemeClr val="tx1">
                     <a:lumMod val="75000"/>
@@ -5446,7 +5371,7 @@
               <a:t>펀딩</a:t>
             </a:r>
             <a:r>
-              <a:rPr lang="en-US" altLang="ko-KR" b="1" dirty="0" smtClean="0">
+              <a:rPr lang="en-US" altLang="ko-KR" b="1" dirty="0">
                 <a:solidFill>
                   <a:schemeClr val="tx1">
                     <a:lumMod val="75000"/>
@@ -5459,7 +5384,7 @@
               <a:t>, </a:t>
             </a:r>
             <a:r>
-              <a:rPr lang="ko-KR" altLang="en-US" b="1" dirty="0" smtClean="0">
+              <a:rPr lang="ko-KR" altLang="en-US" b="1" dirty="0">
                 <a:solidFill>
                   <a:schemeClr val="tx1">
                     <a:lumMod val="75000"/>
@@ -5471,16 +5396,6 @@
               </a:rPr>
               <a:t>주문조회</a:t>
             </a:r>
-            <a:endParaRPr lang="ko-KR" altLang="en-US" b="1" dirty="0">
-              <a:solidFill>
-                <a:schemeClr val="tx1">
-                  <a:lumMod val="75000"/>
-                  <a:lumOff val="25000"/>
-                </a:schemeClr>
-              </a:solidFill>
-              <a:latin typeface="+mj-ea"/>
-              <a:ea typeface="+mj-ea"/>
-            </a:endParaRPr>
           </a:p>
         </p:txBody>
       </p:sp>
@@ -5507,7 +5422,13 @@
             <a:tbl>
               <a:tblPr firstRow="1" bandRow="1"/>
               <a:tblGrid>
-                <a:gridCol w="2688299"/>
+                <a:gridCol w="2688299">
+                  <a:extLst>
+                    <a:ext uri="{9D8B030D-6E8A-4147-A177-3AD203B41FA5}">
+                      <a16:colId xmlns:a16="http://schemas.microsoft.com/office/drawing/2014/main" val="20000"/>
+                    </a:ext>
+                  </a:extLst>
+                </a:gridCol>
               </a:tblGrid>
               <a:tr h="424495">
                 <a:tc>
@@ -5517,7 +5438,7 @@
                     <a:p>
                       <a:pPr algn="ctr" latinLnBrk="1"/>
                       <a:r>
-                        <a:rPr lang="ko-KR" altLang="en-US" sz="1200" b="1" dirty="0" smtClean="0">
+                        <a:rPr lang="ko-KR" altLang="en-US" sz="1200" b="1" dirty="0">
                           <a:solidFill>
                             <a:schemeClr val="tx1"/>
                           </a:solidFill>
@@ -5526,13 +5447,6 @@
                         </a:rPr>
                         <a:t>화면코드</a:t>
                       </a:r>
-                      <a:endParaRPr lang="ko-KR" altLang="en-US" sz="1200" b="1" dirty="0">
-                        <a:solidFill>
-                          <a:schemeClr val="tx1"/>
-                        </a:solidFill>
-                        <a:latin typeface="+mj-ea"/>
-                        <a:ea typeface="+mj-ea"/>
-                      </a:endParaRPr>
                     </a:p>
                   </a:txBody>
                   <a:tcPr marL="121920" marR="121920" marT="60960" marB="60960" anchor="ctr">
@@ -5541,6 +5455,11 @@
                     </a:solidFill>
                   </a:tcPr>
                 </a:tc>
+                <a:extLst>
+                  <a:ext uri="{0D108BD9-81ED-4DB2-BD59-A6C34878D82A}">
+                    <a16:rowId xmlns:a16="http://schemas.microsoft.com/office/drawing/2014/main" val="10000"/>
+                  </a:ext>
+                </a:extLst>
               </a:tr>
               <a:tr h="490571">
                 <a:tc>
@@ -5550,7 +5469,7 @@
                     <a:p>
                       <a:pPr algn="ctr" latinLnBrk="1"/>
                       <a:r>
-                        <a:rPr lang="en-US" altLang="ko-KR" sz="1500" dirty="0" err="1" smtClean="0">
+                        <a:rPr lang="en-US" altLang="ko-KR" sz="1500" dirty="0" err="1">
                           <a:latin typeface="+mj-ea"/>
                           <a:ea typeface="+mj-ea"/>
                         </a:rPr>
@@ -5564,6 +5483,11 @@
                   </a:txBody>
                   <a:tcPr marL="121920" marR="121920" marT="60960" marB="60960" anchor="ctr"/>
                 </a:tc>
+                <a:extLst>
+                  <a:ext uri="{0D108BD9-81ED-4DB2-BD59-A6C34878D82A}">
+                    <a16:rowId xmlns:a16="http://schemas.microsoft.com/office/drawing/2014/main" val="10001"/>
+                  </a:ext>
+                </a:extLst>
               </a:tr>
             </a:tbl>
           </a:graphicData>
@@ -5592,8 +5516,20 @@
             <a:tbl>
               <a:tblPr firstRow="1" bandRow="1"/>
               <a:tblGrid>
-                <a:gridCol w="280507"/>
-                <a:gridCol w="2407792"/>
+                <a:gridCol w="280507">
+                  <a:extLst>
+                    <a:ext uri="{9D8B030D-6E8A-4147-A177-3AD203B41FA5}">
+                      <a16:colId xmlns:a16="http://schemas.microsoft.com/office/drawing/2014/main" val="20000"/>
+                    </a:ext>
+                  </a:extLst>
+                </a:gridCol>
+                <a:gridCol w="2407792">
+                  <a:extLst>
+                    <a:ext uri="{9D8B030D-6E8A-4147-A177-3AD203B41FA5}">
+                      <a16:colId xmlns:a16="http://schemas.microsoft.com/office/drawing/2014/main" val="20001"/>
+                    </a:ext>
+                  </a:extLst>
+                </a:gridCol>
               </a:tblGrid>
               <a:tr h="469796">
                 <a:tc>
@@ -5607,7 +5543,7 @@
                         </a:lnSpc>
                       </a:pPr>
                       <a:r>
-                        <a:rPr lang="en-US" altLang="ko-KR" sz="1200" b="1" dirty="0" smtClean="0">
+                        <a:rPr lang="en-US" altLang="ko-KR" sz="1200" b="1" dirty="0">
                           <a:latin typeface="+mj-ea"/>
                           <a:ea typeface="+mj-ea"/>
                         </a:rPr>
@@ -5636,16 +5572,12 @@
                         </a:lnSpc>
                       </a:pPr>
                       <a:r>
-                        <a:rPr lang="ko-KR" altLang="en-US" sz="1200" b="1" dirty="0" smtClean="0">
+                        <a:rPr lang="ko-KR" altLang="en-US" sz="1200" b="1" dirty="0">
                           <a:latin typeface="+mj-ea"/>
                           <a:ea typeface="+mj-ea"/>
                         </a:rPr>
                         <a:t>기능</a:t>
                       </a:r>
-                      <a:endParaRPr lang="ko-KR" altLang="en-US" sz="1200" b="1" dirty="0">
-                        <a:latin typeface="+mj-ea"/>
-                        <a:ea typeface="+mj-ea"/>
-                      </a:endParaRPr>
                     </a:p>
                   </a:txBody>
                   <a:tcPr marL="121920" marR="121920" marT="60960" marB="60960" anchor="ctr">
@@ -5654,6 +5586,11 @@
                     </a:solidFill>
                   </a:tcPr>
                 </a:tc>
+                <a:extLst>
+                  <a:ext uri="{0D108BD9-81ED-4DB2-BD59-A6C34878D82A}">
+                    <a16:rowId xmlns:a16="http://schemas.microsoft.com/office/drawing/2014/main" val="10000"/>
+                  </a:ext>
+                </a:extLst>
               </a:tr>
               <a:tr h="620107">
                 <a:tc>
@@ -5667,7 +5604,7 @@
                         </a:lnSpc>
                       </a:pPr>
                       <a:r>
-                        <a:rPr lang="en-US" altLang="ko-KR" sz="1300" dirty="0" smtClean="0">
+                        <a:rPr lang="en-US" altLang="ko-KR" sz="1300" dirty="0">
                           <a:latin typeface="+mj-ea"/>
                           <a:ea typeface="+mj-ea"/>
                         </a:rPr>
@@ -5692,27 +5629,27 @@
                         </a:lnSpc>
                       </a:pPr>
                       <a:r>
-                        <a:rPr lang="ko-KR" altLang="en-US" sz="1200" b="1" dirty="0" err="1" smtClean="0">
+                        <a:rPr lang="ko-KR" altLang="en-US" sz="1200" b="1" dirty="0" err="1">
                           <a:latin typeface="+mj-ea"/>
                           <a:ea typeface="+mj-ea"/>
                         </a:rPr>
                         <a:t>펀딩</a:t>
                       </a:r>
                       <a:r>
-                        <a:rPr lang="en-US" altLang="ko-KR" sz="1200" b="1" dirty="0" smtClean="0">
+                        <a:rPr lang="en-US" altLang="ko-KR" sz="1200" b="1" dirty="0">
                           <a:latin typeface="+mj-ea"/>
                           <a:ea typeface="+mj-ea"/>
                         </a:rPr>
                         <a:t>/</a:t>
                       </a:r>
                       <a:r>
-                        <a:rPr lang="ko-KR" altLang="en-US" sz="1200" b="1" dirty="0" smtClean="0">
+                        <a:rPr lang="ko-KR" altLang="en-US" sz="1200" b="1" dirty="0">
                           <a:latin typeface="+mj-ea"/>
                           <a:ea typeface="+mj-ea"/>
                         </a:rPr>
                         <a:t>주문 횟수</a:t>
                       </a:r>
-                      <a:endParaRPr lang="en-US" altLang="ko-KR" sz="1200" b="1" dirty="0" smtClean="0">
+                      <a:endParaRPr lang="en-US" altLang="ko-KR" sz="1200" b="1" dirty="0">
                         <a:latin typeface="+mj-ea"/>
                         <a:ea typeface="+mj-ea"/>
                       </a:endParaRPr>
@@ -5724,27 +5661,28 @@
                         </a:lnSpc>
                       </a:pPr>
                       <a:r>
-                        <a:rPr lang="en-US" altLang="ko-KR" sz="1200" dirty="0" smtClean="0">
+                        <a:rPr lang="en-US" altLang="ko-KR" sz="1200" dirty="0">
                           <a:latin typeface="+mj-ea"/>
                           <a:ea typeface="+mj-ea"/>
                         </a:rPr>
                         <a:t>- </a:t>
                       </a:r>
                       <a:r>
-                        <a:rPr lang="ko-KR" altLang="en-US" sz="1200" dirty="0" smtClean="0">
+                        <a:rPr lang="ko-KR" altLang="en-US" sz="1200" dirty="0">
                           <a:latin typeface="+mj-ea"/>
                           <a:ea typeface="+mj-ea"/>
                         </a:rPr>
                         <a:t>최초 가입이래 총 횟수 표시</a:t>
                       </a:r>
-                      <a:endParaRPr lang="ko-KR" altLang="en-US" sz="1200" dirty="0">
-                        <a:latin typeface="+mj-ea"/>
-                        <a:ea typeface="+mj-ea"/>
-                      </a:endParaRPr>
                     </a:p>
                   </a:txBody>
                   <a:tcPr marL="121920" marR="121920" marT="60960" marB="60960"/>
                 </a:tc>
+                <a:extLst>
+                  <a:ext uri="{0D108BD9-81ED-4DB2-BD59-A6C34878D82A}">
+                    <a16:rowId xmlns:a16="http://schemas.microsoft.com/office/drawing/2014/main" val="10001"/>
+                  </a:ext>
+                </a:extLst>
               </a:tr>
               <a:tr h="620107">
                 <a:tc>
@@ -5758,7 +5696,7 @@
                         </a:lnSpc>
                       </a:pPr>
                       <a:r>
-                        <a:rPr lang="en-US" altLang="ko-KR" sz="1300" dirty="0" smtClean="0">
+                        <a:rPr lang="en-US" altLang="ko-KR" sz="1300" dirty="0">
                           <a:latin typeface="+mj-ea"/>
                           <a:ea typeface="+mj-ea"/>
                         </a:rPr>
@@ -5783,7 +5721,7 @@
                         </a:lnSpc>
                       </a:pPr>
                       <a:r>
-                        <a:rPr lang="ko-KR" altLang="en-US" sz="1200" b="1" i="0" u="none" strike="noStrike" cap="none" dirty="0" smtClean="0">
+                        <a:rPr lang="ko-KR" altLang="en-US" sz="1200" b="1" i="0" u="none" strike="noStrike" cap="none" dirty="0">
                           <a:solidFill>
                             <a:srgbClr val="000000"/>
                           </a:solidFill>
@@ -5794,7 +5732,7 @@
                         </a:rPr>
                         <a:t>프로필 이미지</a:t>
                       </a:r>
-                      <a:endParaRPr lang="en-US" altLang="ko-KR" sz="1200" b="1" i="0" u="none" strike="noStrike" cap="none" dirty="0" smtClean="0">
+                      <a:endParaRPr lang="en-US" altLang="ko-KR" sz="1200" b="1" i="0" u="none" strike="noStrike" cap="none" dirty="0">
                         <a:solidFill>
                           <a:srgbClr val="000000"/>
                         </a:solidFill>
@@ -5811,7 +5749,7 @@
                         </a:lnSpc>
                       </a:pPr>
                       <a:r>
-                        <a:rPr lang="en-US" altLang="ko-KR" sz="1200" b="0" i="0" u="none" strike="noStrike" cap="none" dirty="0" smtClean="0">
+                        <a:rPr lang="en-US" altLang="ko-KR" sz="1200" b="0" i="0" u="none" strike="noStrike" cap="none" dirty="0">
                           <a:solidFill>
                             <a:srgbClr val="000000"/>
                           </a:solidFill>
@@ -5823,7 +5761,7 @@
                         <a:t>- </a:t>
                       </a:r>
                       <a:r>
-                        <a:rPr lang="ko-KR" altLang="en-US" sz="1200" b="0" i="0" u="none" strike="noStrike" cap="none" dirty="0" err="1" smtClean="0">
+                        <a:rPr lang="ko-KR" altLang="en-US" sz="1200" b="0" i="0" u="none" strike="noStrike" cap="none" dirty="0" err="1">
                           <a:solidFill>
                             <a:srgbClr val="000000"/>
                           </a:solidFill>
@@ -5835,7 +5773,7 @@
                         <a:t>클릭시</a:t>
                       </a:r>
                       <a:r>
-                        <a:rPr lang="ko-KR" altLang="en-US" sz="1200" b="0" i="0" u="none" strike="noStrike" cap="none" dirty="0" smtClean="0">
+                        <a:rPr lang="ko-KR" altLang="en-US" sz="1200" b="0" i="0" u="none" strike="noStrike" cap="none" dirty="0">
                           <a:solidFill>
                             <a:srgbClr val="000000"/>
                           </a:solidFill>
@@ -5846,19 +5784,15 @@
                         </a:rPr>
                         <a:t> 확대 이미지 표시</a:t>
                       </a:r>
-                      <a:endParaRPr lang="ko-KR" altLang="en-US" sz="1200" b="0" i="0" u="none" strike="noStrike" cap="none" dirty="0" smtClean="0">
-                        <a:solidFill>
-                          <a:srgbClr val="000000"/>
-                        </a:solidFill>
-                        <a:latin typeface="+mj-ea"/>
-                        <a:ea typeface="+mj-ea"/>
-                        <a:cs typeface="Arial"/>
-                        <a:sym typeface="Arial"/>
-                      </a:endParaRPr>
                     </a:p>
                   </a:txBody>
                   <a:tcPr marL="121920" marR="121920" marT="60960" marB="60960"/>
                 </a:tc>
+                <a:extLst>
+                  <a:ext uri="{0D108BD9-81ED-4DB2-BD59-A6C34878D82A}">
+                    <a16:rowId xmlns:a16="http://schemas.microsoft.com/office/drawing/2014/main" val="10002"/>
+                  </a:ext>
+                </a:extLst>
               </a:tr>
               <a:tr h="620107">
                 <a:tc>
@@ -5872,7 +5806,7 @@
                         </a:lnSpc>
                       </a:pPr>
                       <a:r>
-                        <a:rPr lang="en-US" altLang="ko-KR" sz="1300" dirty="0" smtClean="0">
+                        <a:rPr lang="en-US" altLang="ko-KR" sz="1300" dirty="0">
                           <a:latin typeface="+mj-ea"/>
                           <a:ea typeface="+mj-ea"/>
                         </a:rPr>
@@ -5897,7 +5831,7 @@
                         </a:lnSpc>
                       </a:pPr>
                       <a:r>
-                        <a:rPr lang="ko-KR" altLang="en-US" sz="1200" b="1" i="0" u="none" strike="noStrike" kern="1200" cap="none" dirty="0" smtClean="0">
+                        <a:rPr lang="ko-KR" altLang="en-US" sz="1200" b="1" i="0" u="none" strike="noStrike" kern="1200" cap="none" dirty="0">
                           <a:solidFill>
                             <a:srgbClr val="000000"/>
                           </a:solidFill>
@@ -5909,7 +5843,7 @@
                         <a:t>프로필 편집 </a:t>
                       </a:r>
                       <a:r>
-                        <a:rPr lang="en-US" altLang="ko-KR" sz="1200" b="1" i="0" u="none" strike="noStrike" kern="1200" cap="none" dirty="0" smtClean="0">
+                        <a:rPr lang="en-US" altLang="ko-KR" sz="1200" b="1" i="0" u="none" strike="noStrike" kern="1200" cap="none" dirty="0">
                           <a:solidFill>
                             <a:srgbClr val="000000"/>
                           </a:solidFill>
@@ -5921,7 +5855,7 @@
                         <a:t>(</a:t>
                       </a:r>
                       <a:r>
-                        <a:rPr lang="ko-KR" altLang="en-US" sz="1200" b="1" i="0" u="none" strike="noStrike" kern="1200" cap="none" dirty="0" smtClean="0">
+                        <a:rPr lang="ko-KR" altLang="en-US" sz="1200" b="1" i="0" u="none" strike="noStrike" kern="1200" cap="none" dirty="0">
                           <a:solidFill>
                             <a:srgbClr val="000000"/>
                           </a:solidFill>
@@ -5933,7 +5867,7 @@
                         <a:t>버튼</a:t>
                       </a:r>
                       <a:r>
-                        <a:rPr lang="en-US" altLang="ko-KR" sz="1200" b="1" i="0" u="none" strike="noStrike" kern="1200" cap="none" dirty="0" smtClean="0">
+                        <a:rPr lang="en-US" altLang="ko-KR" sz="1200" b="1" i="0" u="none" strike="noStrike" kern="1200" cap="none" dirty="0">
                           <a:solidFill>
                             <a:srgbClr val="000000"/>
                           </a:solidFill>
@@ -5952,7 +5886,7 @@
                         </a:lnSpc>
                       </a:pPr>
                       <a:r>
-                        <a:rPr lang="en-US" altLang="ko-KR" sz="1200" b="0" i="0" u="none" strike="noStrike" kern="1200" cap="none" dirty="0" smtClean="0">
+                        <a:rPr lang="en-US" altLang="ko-KR" sz="1200" b="0" i="0" u="none" strike="noStrike" kern="1200" cap="none" dirty="0">
                           <a:solidFill>
                             <a:srgbClr val="000000"/>
                           </a:solidFill>
@@ -5964,7 +5898,7 @@
                         <a:t>- </a:t>
                       </a:r>
                       <a:r>
-                        <a:rPr lang="ko-KR" altLang="en-US" sz="1200" b="0" i="0" u="none" strike="noStrike" kern="1200" cap="none" dirty="0" smtClean="0">
+                        <a:rPr lang="ko-KR" altLang="en-US" sz="1200" b="0" i="0" u="none" strike="noStrike" kern="1200" cap="none" dirty="0">
                           <a:solidFill>
                             <a:srgbClr val="000000"/>
                           </a:solidFill>
@@ -5979,6 +5913,11 @@
                   </a:txBody>
                   <a:tcPr marL="121920" marR="121920" marT="60960" marB="60960"/>
                 </a:tc>
+                <a:extLst>
+                  <a:ext uri="{0D108BD9-81ED-4DB2-BD59-A6C34878D82A}">
+                    <a16:rowId xmlns:a16="http://schemas.microsoft.com/office/drawing/2014/main" val="10003"/>
+                  </a:ext>
+                </a:extLst>
               </a:tr>
               <a:tr h="620107">
                 <a:tc>
@@ -5992,7 +5931,7 @@
                         </a:lnSpc>
                       </a:pPr>
                       <a:r>
-                        <a:rPr lang="en-US" altLang="ko-KR" sz="1300" dirty="0" smtClean="0">
+                        <a:rPr lang="en-US" altLang="ko-KR" sz="1300" dirty="0">
                           <a:latin typeface="+mj-ea"/>
                           <a:ea typeface="+mj-ea"/>
                         </a:rPr>
@@ -6017,7 +5956,7 @@
                         </a:lnSpc>
                       </a:pPr>
                       <a:r>
-                        <a:rPr lang="ko-KR" altLang="en-US" sz="1200" b="1" i="0" u="none" strike="noStrike" kern="1200" cap="none" dirty="0" smtClean="0">
+                        <a:rPr lang="ko-KR" altLang="en-US" sz="1200" b="1" i="0" u="none" strike="noStrike" kern="1200" cap="none" dirty="0">
                           <a:solidFill>
                             <a:srgbClr val="000000"/>
                           </a:solidFill>
@@ -6029,7 +5968,7 @@
                         <a:t>내역조회 </a:t>
                       </a:r>
                       <a:r>
-                        <a:rPr lang="en-US" altLang="ko-KR" sz="1200" b="1" i="0" u="none" strike="noStrike" kern="1200" cap="none" dirty="0" smtClean="0">
+                        <a:rPr lang="en-US" altLang="ko-KR" sz="1200" b="1" i="0" u="none" strike="noStrike" kern="1200" cap="none" dirty="0">
                           <a:solidFill>
                             <a:srgbClr val="000000"/>
                           </a:solidFill>
@@ -6041,7 +5980,7 @@
                         <a:t>(</a:t>
                       </a:r>
                       <a:r>
-                        <a:rPr lang="ko-KR" altLang="en-US" sz="1200" b="1" i="0" u="none" strike="noStrike" kern="1200" cap="none" dirty="0" smtClean="0">
+                        <a:rPr lang="ko-KR" altLang="en-US" sz="1200" b="1" i="0" u="none" strike="noStrike" kern="1200" cap="none" dirty="0">
                           <a:solidFill>
                             <a:srgbClr val="000000"/>
                           </a:solidFill>
@@ -6053,7 +5992,7 @@
                         <a:t>탭</a:t>
                       </a:r>
                       <a:r>
-                        <a:rPr lang="en-US" altLang="ko-KR" sz="1200" b="1" i="0" u="none" strike="noStrike" kern="1200" cap="none" dirty="0" smtClean="0">
+                        <a:rPr lang="en-US" altLang="ko-KR" sz="1200" b="1" i="0" u="none" strike="noStrike" kern="1200" cap="none" dirty="0">
                           <a:solidFill>
                             <a:srgbClr val="000000"/>
                           </a:solidFill>
@@ -6072,7 +6011,7 @@
                         </a:lnSpc>
                       </a:pPr>
                       <a:r>
-                        <a:rPr lang="en-US" altLang="ko-KR" sz="1200" b="0" i="0" u="none" strike="noStrike" kern="1200" cap="none" dirty="0" smtClean="0">
+                        <a:rPr lang="en-US" altLang="ko-KR" sz="1200" b="0" i="0" u="none" strike="noStrike" kern="1200" cap="none" dirty="0">
                           <a:solidFill>
                             <a:srgbClr val="000000"/>
                           </a:solidFill>
@@ -6084,7 +6023,7 @@
                         <a:t>-</a:t>
                       </a:r>
                       <a:r>
-                        <a:rPr lang="en-US" altLang="ko-KR" sz="1200" b="0" i="0" u="none" strike="noStrike" kern="1200" cap="none" baseline="0" dirty="0" smtClean="0">
+                        <a:rPr lang="en-US" altLang="ko-KR" sz="1200" b="0" i="0" u="none" strike="noStrike" kern="1200" cap="none" baseline="0" dirty="0">
                           <a:solidFill>
                             <a:srgbClr val="000000"/>
                           </a:solidFill>
@@ -6096,7 +6035,7 @@
                         <a:t> </a:t>
                       </a:r>
                       <a:r>
-                        <a:rPr lang="ko-KR" altLang="en-US" sz="1200" b="0" i="0" u="none" strike="noStrike" kern="1200" cap="none" baseline="0" dirty="0" smtClean="0">
+                        <a:rPr lang="ko-KR" altLang="en-US" sz="1200" b="0" i="0" u="none" strike="noStrike" kern="1200" cap="none" baseline="0" dirty="0">
                           <a:solidFill>
                             <a:srgbClr val="000000"/>
                           </a:solidFill>
@@ -6107,7 +6046,7 @@
                         </a:rPr>
                         <a:t>내역이 없을 때는 빈 화면 으로 표시</a:t>
                       </a:r>
-                      <a:endParaRPr lang="ko-KR" altLang="en-US" sz="1200" b="0" i="0" u="none" strike="noStrike" kern="1200" cap="none" dirty="0" smtClean="0">
+                      <a:endParaRPr lang="ko-KR" altLang="en-US" sz="1200" b="0" i="0" u="none" strike="noStrike" kern="1200" cap="none" dirty="0">
                         <a:solidFill>
                           <a:srgbClr val="000000"/>
                         </a:solidFill>
@@ -6120,6 +6059,11 @@
                   </a:txBody>
                   <a:tcPr marL="121920" marR="121920" marT="60960" marB="60960"/>
                 </a:tc>
+                <a:extLst>
+                  <a:ext uri="{0D108BD9-81ED-4DB2-BD59-A6C34878D82A}">
+                    <a16:rowId xmlns:a16="http://schemas.microsoft.com/office/drawing/2014/main" val="10004"/>
+                  </a:ext>
+                </a:extLst>
               </a:tr>
             </a:tbl>
           </a:graphicData>
@@ -6168,7 +6112,7 @@
           <a:p>
             <a:pPr algn="ctr"/>
             <a:r>
-              <a:rPr lang="en-US" altLang="ko-KR" sz="1400" b="1" dirty="0" smtClean="0">
+              <a:rPr lang="en-US" altLang="ko-KR" sz="1400" b="1" dirty="0">
                 <a:solidFill>
                   <a:schemeClr val="bg1"/>
                 </a:solidFill>
@@ -6226,7 +6170,7 @@
           <a:p>
             <a:pPr algn="ctr"/>
             <a:r>
-              <a:rPr lang="en-US" altLang="ko-KR" sz="1400" b="1" dirty="0" smtClean="0">
+              <a:rPr lang="en-US" altLang="ko-KR" sz="1400" b="1" dirty="0">
                 <a:solidFill>
                   <a:schemeClr val="bg1"/>
                 </a:solidFill>
@@ -6284,7 +6228,7 @@
           <a:p>
             <a:pPr algn="ctr"/>
             <a:r>
-              <a:rPr lang="en-US" altLang="ko-KR" sz="1400" b="1" dirty="0" smtClean="0">
+              <a:rPr lang="en-US" altLang="ko-KR" sz="1400" b="1" dirty="0">
                 <a:solidFill>
                   <a:schemeClr val="bg1"/>
                 </a:solidFill>
@@ -6342,7 +6286,7 @@
           <a:p>
             <a:pPr algn="ctr"/>
             <a:r>
-              <a:rPr lang="en-US" altLang="ko-KR" sz="1400" b="1" dirty="0" smtClean="0">
+              <a:rPr lang="en-US" altLang="ko-KR" sz="1400" b="1" dirty="0">
                 <a:solidFill>
                   <a:schemeClr val="bg1"/>
                 </a:solidFill>
@@ -6596,7 +6540,7 @@
           <a:p>
             <a:pPr algn="ctr"/>
             <a:r>
-              <a:rPr lang="en-US" altLang="ko-KR" sz="1300" b="1" dirty="0" smtClean="0">
+              <a:rPr lang="en-US" altLang="ko-KR" sz="1300" b="1" dirty="0">
                 <a:solidFill>
                   <a:schemeClr val="bg1"/>
                 </a:solidFill>
@@ -6654,7 +6598,7 @@
           <a:p>
             <a:pPr algn="ctr"/>
             <a:r>
-              <a:rPr lang="en-US" altLang="ko-KR" sz="1300" b="1" dirty="0" smtClean="0">
+              <a:rPr lang="en-US" altLang="ko-KR" sz="1300" b="1" dirty="0">
                 <a:solidFill>
                   <a:schemeClr val="bg1"/>
                 </a:solidFill>
@@ -6712,7 +6656,7 @@
           <a:p>
             <a:pPr algn="ctr"/>
             <a:r>
-              <a:rPr lang="en-US" altLang="ko-KR" sz="1300" b="1" dirty="0" smtClean="0">
+              <a:rPr lang="en-US" altLang="ko-KR" sz="1300" b="1" dirty="0">
                 <a:solidFill>
                   <a:schemeClr val="bg1"/>
                 </a:solidFill>
@@ -6801,13 +6745,6 @@
   <p:clrMapOvr>
     <a:masterClrMapping/>
   </p:clrMapOvr>
-  <p:timing>
-    <p:tnLst>
-      <p:par>
-        <p:cTn id="1" dur="indefinite" restart="never" nodeType="tmRoot"/>
-      </p:par>
-    </p:tnLst>
-  </p:timing>
 </p:sld>
 </file>
 
@@ -7710,23 +7647,10 @@
                 <a:latin typeface="+mj-ea"/>
                 <a:ea typeface="+mj-ea"/>
               </a:rPr>
-              <a:t>-</a:t>
+              <a:t>- </a:t>
             </a:r>
             <a:r>
-              <a:rPr lang="en-US" altLang="ko-KR" sz="2400" b="1" dirty="0" smtClean="0">
-                <a:solidFill>
-                  <a:schemeClr val="tx1">
-                    <a:lumMod val="75000"/>
-                    <a:lumOff val="25000"/>
-                  </a:schemeClr>
-                </a:solidFill>
-                <a:latin typeface="+mj-ea"/>
-                <a:ea typeface="+mj-ea"/>
-              </a:rPr>
-              <a:t> </a:t>
-            </a:r>
-            <a:r>
-              <a:rPr lang="ko-KR" altLang="en-US" sz="2400" b="1" dirty="0" err="1" smtClean="0">
+              <a:rPr lang="ko-KR" altLang="en-US" sz="2400" b="1" dirty="0" err="1">
                 <a:solidFill>
                   <a:schemeClr val="tx1">
                     <a:lumMod val="75000"/>
@@ -7739,7 +7663,7 @@
               <a:t>마이페이지</a:t>
             </a:r>
             <a:r>
-              <a:rPr lang="ko-KR" altLang="en-US" sz="2400" b="1" dirty="0" smtClean="0">
+              <a:rPr lang="ko-KR" altLang="en-US" sz="2400" b="1" dirty="0">
                 <a:solidFill>
                   <a:schemeClr val="tx1">
                     <a:lumMod val="75000"/>
@@ -7762,23 +7686,10 @@
                 <a:latin typeface="+mj-ea"/>
                 <a:ea typeface="+mj-ea"/>
               </a:rPr>
-              <a:t>-</a:t>
+              <a:t>- </a:t>
             </a:r>
             <a:r>
-              <a:rPr lang="en-US" altLang="ko-KR" sz="2400" b="1" dirty="0" smtClean="0">
-                <a:solidFill>
-                  <a:schemeClr val="tx1">
-                    <a:lumMod val="75000"/>
-                    <a:lumOff val="25000"/>
-                  </a:schemeClr>
-                </a:solidFill>
-                <a:latin typeface="+mj-ea"/>
-                <a:ea typeface="+mj-ea"/>
-              </a:rPr>
-              <a:t> </a:t>
-            </a:r>
-            <a:r>
-              <a:rPr lang="ko-KR" altLang="en-US" b="1" dirty="0" smtClean="0">
+              <a:rPr lang="ko-KR" altLang="en-US" b="1" dirty="0">
                 <a:solidFill>
                   <a:schemeClr val="tx1">
                     <a:lumMod val="75000"/>
@@ -7791,7 +7702,7 @@
               <a:t>관심프로젝트</a:t>
             </a:r>
             <a:r>
-              <a:rPr lang="en-US" altLang="ko-KR" b="1" dirty="0" smtClean="0">
+              <a:rPr lang="en-US" altLang="ko-KR" b="1" dirty="0">
                 <a:solidFill>
                   <a:schemeClr val="tx1">
                     <a:lumMod val="75000"/>
@@ -7804,7 +7715,7 @@
               <a:t>, </a:t>
             </a:r>
             <a:r>
-              <a:rPr lang="ko-KR" altLang="en-US" b="1" dirty="0" smtClean="0">
+              <a:rPr lang="ko-KR" altLang="en-US" b="1" dirty="0">
                 <a:solidFill>
                   <a:schemeClr val="tx1">
                     <a:lumMod val="75000"/>
@@ -7817,7 +7728,7 @@
               <a:t>나의 </a:t>
             </a:r>
             <a:r>
-              <a:rPr lang="ko-KR" altLang="en-US" b="1" dirty="0" err="1" smtClean="0">
+              <a:rPr lang="ko-KR" altLang="en-US" b="1" dirty="0" err="1">
                 <a:solidFill>
                   <a:schemeClr val="tx1">
                     <a:lumMod val="75000"/>
@@ -7830,7 +7741,7 @@
               <a:t>펀딩</a:t>
             </a:r>
             <a:r>
-              <a:rPr lang="en-US" altLang="ko-KR" b="1" dirty="0" smtClean="0">
+              <a:rPr lang="en-US" altLang="ko-KR" b="1" dirty="0">
                 <a:solidFill>
                   <a:schemeClr val="tx1">
                     <a:lumMod val="75000"/>
@@ -7843,7 +7754,7 @@
               <a:t>, </a:t>
             </a:r>
             <a:r>
-              <a:rPr lang="ko-KR" altLang="en-US" b="1" dirty="0" smtClean="0">
+              <a:rPr lang="ko-KR" altLang="en-US" b="1" dirty="0">
                 <a:solidFill>
                   <a:schemeClr val="tx1">
                     <a:lumMod val="75000"/>
@@ -7855,16 +7766,6 @@
               </a:rPr>
               <a:t>주문조회</a:t>
             </a:r>
-            <a:endParaRPr lang="ko-KR" altLang="en-US" b="1" dirty="0">
-              <a:solidFill>
-                <a:schemeClr val="tx1">
-                  <a:lumMod val="75000"/>
-                  <a:lumOff val="25000"/>
-                </a:schemeClr>
-              </a:solidFill>
-              <a:latin typeface="+mj-ea"/>
-              <a:ea typeface="+mj-ea"/>
-            </a:endParaRPr>
           </a:p>
         </p:txBody>
       </p:sp>
@@ -7891,7 +7792,13 @@
             <a:tbl>
               <a:tblPr firstRow="1" bandRow="1"/>
               <a:tblGrid>
-                <a:gridCol w="2688299"/>
+                <a:gridCol w="2688299">
+                  <a:extLst>
+                    <a:ext uri="{9D8B030D-6E8A-4147-A177-3AD203B41FA5}">
+                      <a16:colId xmlns:a16="http://schemas.microsoft.com/office/drawing/2014/main" val="20000"/>
+                    </a:ext>
+                  </a:extLst>
+                </a:gridCol>
               </a:tblGrid>
               <a:tr h="424495">
                 <a:tc>
@@ -7901,7 +7808,7 @@
                     <a:p>
                       <a:pPr algn="ctr" latinLnBrk="1"/>
                       <a:r>
-                        <a:rPr lang="ko-KR" altLang="en-US" sz="1200" b="1" dirty="0" smtClean="0">
+                        <a:rPr lang="ko-KR" altLang="en-US" sz="1200" b="1" dirty="0">
                           <a:solidFill>
                             <a:schemeClr val="tx1"/>
                           </a:solidFill>
@@ -7910,13 +7817,6 @@
                         </a:rPr>
                         <a:t>화면코드</a:t>
                       </a:r>
-                      <a:endParaRPr lang="ko-KR" altLang="en-US" sz="1200" b="1" dirty="0">
-                        <a:solidFill>
-                          <a:schemeClr val="tx1"/>
-                        </a:solidFill>
-                        <a:latin typeface="+mj-ea"/>
-                        <a:ea typeface="+mj-ea"/>
-                      </a:endParaRPr>
                     </a:p>
                   </a:txBody>
                   <a:tcPr marL="121920" marR="121920" marT="60960" marB="60960" anchor="ctr">
@@ -7925,6 +7825,11 @@
                     </a:solidFill>
                   </a:tcPr>
                 </a:tc>
+                <a:extLst>
+                  <a:ext uri="{0D108BD9-81ED-4DB2-BD59-A6C34878D82A}">
+                    <a16:rowId xmlns:a16="http://schemas.microsoft.com/office/drawing/2014/main" val="10000"/>
+                  </a:ext>
+                </a:extLst>
               </a:tr>
               <a:tr h="490571">
                 <a:tc>
@@ -7934,7 +7839,7 @@
                     <a:p>
                       <a:pPr algn="ctr" latinLnBrk="1"/>
                       <a:r>
-                        <a:rPr lang="en-US" altLang="ko-KR" sz="1500" dirty="0" err="1" smtClean="0">
+                        <a:rPr lang="en-US" altLang="ko-KR" sz="1500" dirty="0" err="1">
                           <a:latin typeface="+mj-ea"/>
                           <a:ea typeface="+mj-ea"/>
                         </a:rPr>
@@ -7948,6 +7853,11 @@
                   </a:txBody>
                   <a:tcPr marL="121920" marR="121920" marT="60960" marB="60960" anchor="ctr"/>
                 </a:tc>
+                <a:extLst>
+                  <a:ext uri="{0D108BD9-81ED-4DB2-BD59-A6C34878D82A}">
+                    <a16:rowId xmlns:a16="http://schemas.microsoft.com/office/drawing/2014/main" val="10001"/>
+                  </a:ext>
+                </a:extLst>
               </a:tr>
             </a:tbl>
           </a:graphicData>
@@ -7976,8 +7886,20 @@
             <a:tbl>
               <a:tblPr firstRow="1" bandRow="1"/>
               <a:tblGrid>
-                <a:gridCol w="280507"/>
-                <a:gridCol w="2407792"/>
+                <a:gridCol w="280507">
+                  <a:extLst>
+                    <a:ext uri="{9D8B030D-6E8A-4147-A177-3AD203B41FA5}">
+                      <a16:colId xmlns:a16="http://schemas.microsoft.com/office/drawing/2014/main" val="20000"/>
+                    </a:ext>
+                  </a:extLst>
+                </a:gridCol>
+                <a:gridCol w="2407792">
+                  <a:extLst>
+                    <a:ext uri="{9D8B030D-6E8A-4147-A177-3AD203B41FA5}">
+                      <a16:colId xmlns:a16="http://schemas.microsoft.com/office/drawing/2014/main" val="20001"/>
+                    </a:ext>
+                  </a:extLst>
+                </a:gridCol>
               </a:tblGrid>
               <a:tr h="469796">
                 <a:tc>
@@ -7991,7 +7913,7 @@
                         </a:lnSpc>
                       </a:pPr>
                       <a:r>
-                        <a:rPr lang="en-US" altLang="ko-KR" sz="1200" b="1" dirty="0" smtClean="0">
+                        <a:rPr lang="en-US" altLang="ko-KR" sz="1200" b="1" dirty="0">
                           <a:latin typeface="+mj-ea"/>
                           <a:ea typeface="+mj-ea"/>
                         </a:rPr>
@@ -8020,16 +7942,12 @@
                         </a:lnSpc>
                       </a:pPr>
                       <a:r>
-                        <a:rPr lang="ko-KR" altLang="en-US" sz="1200" b="1" dirty="0" smtClean="0">
+                        <a:rPr lang="ko-KR" altLang="en-US" sz="1200" b="1" dirty="0">
                           <a:latin typeface="+mj-ea"/>
                           <a:ea typeface="+mj-ea"/>
                         </a:rPr>
                         <a:t>기능</a:t>
                       </a:r>
-                      <a:endParaRPr lang="ko-KR" altLang="en-US" sz="1200" b="1" dirty="0">
-                        <a:latin typeface="+mj-ea"/>
-                        <a:ea typeface="+mj-ea"/>
-                      </a:endParaRPr>
                     </a:p>
                   </a:txBody>
                   <a:tcPr marL="121920" marR="121920" marT="60960" marB="60960" anchor="ctr">
@@ -8038,6 +7956,11 @@
                     </a:solidFill>
                   </a:tcPr>
                 </a:tc>
+                <a:extLst>
+                  <a:ext uri="{0D108BD9-81ED-4DB2-BD59-A6C34878D82A}">
+                    <a16:rowId xmlns:a16="http://schemas.microsoft.com/office/drawing/2014/main" val="10000"/>
+                  </a:ext>
+                </a:extLst>
               </a:tr>
               <a:tr h="620107">
                 <a:tc>
@@ -8051,7 +7974,7 @@
                         </a:lnSpc>
                       </a:pPr>
                       <a:r>
-                        <a:rPr lang="en-US" altLang="ko-KR" sz="1300" dirty="0" smtClean="0">
+                        <a:rPr lang="en-US" altLang="ko-KR" sz="1300" dirty="0">
                           <a:latin typeface="+mj-ea"/>
                           <a:ea typeface="+mj-ea"/>
                         </a:rPr>
@@ -8076,27 +7999,27 @@
                         </a:lnSpc>
                       </a:pPr>
                       <a:r>
-                        <a:rPr lang="ko-KR" altLang="en-US" sz="1200" b="1" dirty="0" err="1" smtClean="0">
+                        <a:rPr lang="ko-KR" altLang="en-US" sz="1200" b="1" dirty="0" err="1">
                           <a:latin typeface="+mj-ea"/>
                           <a:ea typeface="+mj-ea"/>
                         </a:rPr>
                         <a:t>펀딩</a:t>
                       </a:r>
                       <a:r>
-                        <a:rPr lang="en-US" altLang="ko-KR" sz="1200" b="1" dirty="0" smtClean="0">
+                        <a:rPr lang="en-US" altLang="ko-KR" sz="1200" b="1" dirty="0">
                           <a:latin typeface="+mj-ea"/>
                           <a:ea typeface="+mj-ea"/>
                         </a:rPr>
                         <a:t>/</a:t>
                       </a:r>
                       <a:r>
-                        <a:rPr lang="ko-KR" altLang="en-US" sz="1200" b="1" dirty="0" smtClean="0">
+                        <a:rPr lang="ko-KR" altLang="en-US" sz="1200" b="1" dirty="0">
                           <a:latin typeface="+mj-ea"/>
                           <a:ea typeface="+mj-ea"/>
                         </a:rPr>
                         <a:t>주문 횟수</a:t>
                       </a:r>
-                      <a:endParaRPr lang="en-US" altLang="ko-KR" sz="1200" b="1" dirty="0" smtClean="0">
+                      <a:endParaRPr lang="en-US" altLang="ko-KR" sz="1200" b="1" dirty="0">
                         <a:latin typeface="+mj-ea"/>
                         <a:ea typeface="+mj-ea"/>
                       </a:endParaRPr>
@@ -8108,27 +8031,28 @@
                         </a:lnSpc>
                       </a:pPr>
                       <a:r>
-                        <a:rPr lang="en-US" altLang="ko-KR" sz="1200" dirty="0" smtClean="0">
+                        <a:rPr lang="en-US" altLang="ko-KR" sz="1200" dirty="0">
                           <a:latin typeface="+mj-ea"/>
                           <a:ea typeface="+mj-ea"/>
                         </a:rPr>
                         <a:t>- </a:t>
                       </a:r>
                       <a:r>
-                        <a:rPr lang="ko-KR" altLang="en-US" sz="1200" dirty="0" smtClean="0">
+                        <a:rPr lang="ko-KR" altLang="en-US" sz="1200" dirty="0">
                           <a:latin typeface="+mj-ea"/>
                           <a:ea typeface="+mj-ea"/>
                         </a:rPr>
                         <a:t>최초 가입이래 총 횟수 표시</a:t>
                       </a:r>
-                      <a:endParaRPr lang="ko-KR" altLang="en-US" sz="1200" dirty="0">
-                        <a:latin typeface="+mj-ea"/>
-                        <a:ea typeface="+mj-ea"/>
-                      </a:endParaRPr>
                     </a:p>
                   </a:txBody>
                   <a:tcPr marL="121920" marR="121920" marT="60960" marB="60960"/>
                 </a:tc>
+                <a:extLst>
+                  <a:ext uri="{0D108BD9-81ED-4DB2-BD59-A6C34878D82A}">
+                    <a16:rowId xmlns:a16="http://schemas.microsoft.com/office/drawing/2014/main" val="10001"/>
+                  </a:ext>
+                </a:extLst>
               </a:tr>
               <a:tr h="620107">
                 <a:tc>
@@ -8142,7 +8066,7 @@
                         </a:lnSpc>
                       </a:pPr>
                       <a:r>
-                        <a:rPr lang="en-US" altLang="ko-KR" sz="1300" dirty="0" smtClean="0">
+                        <a:rPr lang="en-US" altLang="ko-KR" sz="1300" dirty="0">
                           <a:latin typeface="+mj-ea"/>
                           <a:ea typeface="+mj-ea"/>
                         </a:rPr>
@@ -8167,7 +8091,7 @@
                         </a:lnSpc>
                       </a:pPr>
                       <a:r>
-                        <a:rPr lang="ko-KR" altLang="en-US" sz="1200" b="1" i="0" u="none" strike="noStrike" cap="none" dirty="0" smtClean="0">
+                        <a:rPr lang="ko-KR" altLang="en-US" sz="1200" b="1" i="0" u="none" strike="noStrike" cap="none" dirty="0">
                           <a:solidFill>
                             <a:srgbClr val="000000"/>
                           </a:solidFill>
@@ -8178,7 +8102,7 @@
                         </a:rPr>
                         <a:t>프로필 이미지</a:t>
                       </a:r>
-                      <a:endParaRPr lang="en-US" altLang="ko-KR" sz="1200" b="1" i="0" u="none" strike="noStrike" cap="none" dirty="0" smtClean="0">
+                      <a:endParaRPr lang="en-US" altLang="ko-KR" sz="1200" b="1" i="0" u="none" strike="noStrike" cap="none" dirty="0">
                         <a:solidFill>
                           <a:srgbClr val="000000"/>
                         </a:solidFill>
@@ -8195,7 +8119,7 @@
                         </a:lnSpc>
                       </a:pPr>
                       <a:r>
-                        <a:rPr lang="en-US" altLang="ko-KR" sz="1200" b="0" i="0" u="none" strike="noStrike" cap="none" dirty="0" smtClean="0">
+                        <a:rPr lang="en-US" altLang="ko-KR" sz="1200" b="0" i="0" u="none" strike="noStrike" cap="none" dirty="0">
                           <a:solidFill>
                             <a:srgbClr val="000000"/>
                           </a:solidFill>
@@ -8207,7 +8131,7 @@
                         <a:t>- </a:t>
                       </a:r>
                       <a:r>
-                        <a:rPr lang="ko-KR" altLang="en-US" sz="1200" b="0" i="0" u="none" strike="noStrike" cap="none" dirty="0" err="1" smtClean="0">
+                        <a:rPr lang="ko-KR" altLang="en-US" sz="1200" b="0" i="0" u="none" strike="noStrike" cap="none" dirty="0" err="1">
                           <a:solidFill>
                             <a:srgbClr val="000000"/>
                           </a:solidFill>
@@ -8219,7 +8143,7 @@
                         <a:t>클릭시</a:t>
                       </a:r>
                       <a:r>
-                        <a:rPr lang="ko-KR" altLang="en-US" sz="1200" b="0" i="0" u="none" strike="noStrike" cap="none" dirty="0" smtClean="0">
+                        <a:rPr lang="ko-KR" altLang="en-US" sz="1200" b="0" i="0" u="none" strike="noStrike" cap="none" dirty="0">
                           <a:solidFill>
                             <a:srgbClr val="000000"/>
                           </a:solidFill>
@@ -8230,19 +8154,15 @@
                         </a:rPr>
                         <a:t> 확대 이미지 표시</a:t>
                       </a:r>
-                      <a:endParaRPr lang="ko-KR" altLang="en-US" sz="1200" b="0" i="0" u="none" strike="noStrike" cap="none" dirty="0" smtClean="0">
-                        <a:solidFill>
-                          <a:srgbClr val="000000"/>
-                        </a:solidFill>
-                        <a:latin typeface="+mj-ea"/>
-                        <a:ea typeface="+mj-ea"/>
-                        <a:cs typeface="Arial"/>
-                        <a:sym typeface="Arial"/>
-                      </a:endParaRPr>
                     </a:p>
                   </a:txBody>
                   <a:tcPr marL="121920" marR="121920" marT="60960" marB="60960"/>
                 </a:tc>
+                <a:extLst>
+                  <a:ext uri="{0D108BD9-81ED-4DB2-BD59-A6C34878D82A}">
+                    <a16:rowId xmlns:a16="http://schemas.microsoft.com/office/drawing/2014/main" val="10002"/>
+                  </a:ext>
+                </a:extLst>
               </a:tr>
               <a:tr h="620107">
                 <a:tc>
@@ -8256,7 +8176,7 @@
                         </a:lnSpc>
                       </a:pPr>
                       <a:r>
-                        <a:rPr lang="en-US" altLang="ko-KR" sz="1300" dirty="0" smtClean="0">
+                        <a:rPr lang="en-US" altLang="ko-KR" sz="1300" dirty="0">
                           <a:latin typeface="+mj-ea"/>
                           <a:ea typeface="+mj-ea"/>
                         </a:rPr>
@@ -8281,7 +8201,7 @@
                         </a:lnSpc>
                       </a:pPr>
                       <a:r>
-                        <a:rPr lang="ko-KR" altLang="en-US" sz="1200" b="1" i="0" u="none" strike="noStrike" kern="1200" cap="none" dirty="0" smtClean="0">
+                        <a:rPr lang="ko-KR" altLang="en-US" sz="1200" b="1" i="0" u="none" strike="noStrike" kern="1200" cap="none" dirty="0">
                           <a:solidFill>
                             <a:srgbClr val="000000"/>
                           </a:solidFill>
@@ -8293,7 +8213,7 @@
                         <a:t>프로필 편집 </a:t>
                       </a:r>
                       <a:r>
-                        <a:rPr lang="en-US" altLang="ko-KR" sz="1200" b="1" i="0" u="none" strike="noStrike" kern="1200" cap="none" dirty="0" smtClean="0">
+                        <a:rPr lang="en-US" altLang="ko-KR" sz="1200" b="1" i="0" u="none" strike="noStrike" kern="1200" cap="none" dirty="0">
                           <a:solidFill>
                             <a:srgbClr val="000000"/>
                           </a:solidFill>
@@ -8305,7 +8225,7 @@
                         <a:t>(</a:t>
                       </a:r>
                       <a:r>
-                        <a:rPr lang="ko-KR" altLang="en-US" sz="1200" b="1" i="0" u="none" strike="noStrike" kern="1200" cap="none" dirty="0" smtClean="0">
+                        <a:rPr lang="ko-KR" altLang="en-US" sz="1200" b="1" i="0" u="none" strike="noStrike" kern="1200" cap="none" dirty="0">
                           <a:solidFill>
                             <a:srgbClr val="000000"/>
                           </a:solidFill>
@@ -8317,7 +8237,7 @@
                         <a:t>버튼</a:t>
                       </a:r>
                       <a:r>
-                        <a:rPr lang="en-US" altLang="ko-KR" sz="1200" b="1" i="0" u="none" strike="noStrike" kern="1200" cap="none" dirty="0" smtClean="0">
+                        <a:rPr lang="en-US" altLang="ko-KR" sz="1200" b="1" i="0" u="none" strike="noStrike" kern="1200" cap="none" dirty="0">
                           <a:solidFill>
                             <a:srgbClr val="000000"/>
                           </a:solidFill>
@@ -8336,7 +8256,7 @@
                         </a:lnSpc>
                       </a:pPr>
                       <a:r>
-                        <a:rPr lang="en-US" altLang="ko-KR" sz="1200" b="0" i="0" u="none" strike="noStrike" kern="1200" cap="none" dirty="0" smtClean="0">
+                        <a:rPr lang="en-US" altLang="ko-KR" sz="1200" b="0" i="0" u="none" strike="noStrike" kern="1200" cap="none" dirty="0">
                           <a:solidFill>
                             <a:srgbClr val="000000"/>
                           </a:solidFill>
@@ -8348,7 +8268,7 @@
                         <a:t>- </a:t>
                       </a:r>
                       <a:r>
-                        <a:rPr lang="ko-KR" altLang="en-US" sz="1200" b="0" i="0" u="none" strike="noStrike" kern="1200" cap="none" dirty="0" smtClean="0">
+                        <a:rPr lang="ko-KR" altLang="en-US" sz="1200" b="0" i="0" u="none" strike="noStrike" kern="1200" cap="none" dirty="0">
                           <a:solidFill>
                             <a:srgbClr val="000000"/>
                           </a:solidFill>
@@ -8363,6 +8283,11 @@
                   </a:txBody>
                   <a:tcPr marL="121920" marR="121920" marT="60960" marB="60960"/>
                 </a:tc>
+                <a:extLst>
+                  <a:ext uri="{0D108BD9-81ED-4DB2-BD59-A6C34878D82A}">
+                    <a16:rowId xmlns:a16="http://schemas.microsoft.com/office/drawing/2014/main" val="10003"/>
+                  </a:ext>
+                </a:extLst>
               </a:tr>
               <a:tr h="620107">
                 <a:tc>
@@ -8376,7 +8301,7 @@
                         </a:lnSpc>
                       </a:pPr>
                       <a:r>
-                        <a:rPr lang="en-US" altLang="ko-KR" sz="1300" dirty="0" smtClean="0">
+                        <a:rPr lang="en-US" altLang="ko-KR" sz="1300" dirty="0">
                           <a:latin typeface="+mj-ea"/>
                           <a:ea typeface="+mj-ea"/>
                         </a:rPr>
@@ -8401,7 +8326,7 @@
                         </a:lnSpc>
                       </a:pPr>
                       <a:r>
-                        <a:rPr lang="ko-KR" altLang="en-US" sz="1200" b="1" i="0" u="none" strike="noStrike" kern="1200" cap="none" dirty="0" smtClean="0">
+                        <a:rPr lang="ko-KR" altLang="en-US" sz="1200" b="1" i="0" u="none" strike="noStrike" kern="1200" cap="none" dirty="0">
                           <a:solidFill>
                             <a:srgbClr val="000000"/>
                           </a:solidFill>
@@ -8413,7 +8338,7 @@
                         <a:t>내역조회 </a:t>
                       </a:r>
                       <a:r>
-                        <a:rPr lang="en-US" altLang="ko-KR" sz="1200" b="1" i="0" u="none" strike="noStrike" kern="1200" cap="none" dirty="0" smtClean="0">
+                        <a:rPr lang="en-US" altLang="ko-KR" sz="1200" b="1" i="0" u="none" strike="noStrike" kern="1200" cap="none" dirty="0">
                           <a:solidFill>
                             <a:srgbClr val="000000"/>
                           </a:solidFill>
@@ -8425,7 +8350,7 @@
                         <a:t>(</a:t>
                       </a:r>
                       <a:r>
-                        <a:rPr lang="ko-KR" altLang="en-US" sz="1200" b="1" i="0" u="none" strike="noStrike" kern="1200" cap="none" dirty="0" smtClean="0">
+                        <a:rPr lang="ko-KR" altLang="en-US" sz="1200" b="1" i="0" u="none" strike="noStrike" kern="1200" cap="none" dirty="0">
                           <a:solidFill>
                             <a:srgbClr val="000000"/>
                           </a:solidFill>
@@ -8437,7 +8362,7 @@
                         <a:t>탭</a:t>
                       </a:r>
                       <a:r>
-                        <a:rPr lang="en-US" altLang="ko-KR" sz="1200" b="1" i="0" u="none" strike="noStrike" kern="1200" cap="none" dirty="0" smtClean="0">
+                        <a:rPr lang="en-US" altLang="ko-KR" sz="1200" b="1" i="0" u="none" strike="noStrike" kern="1200" cap="none" dirty="0">
                           <a:solidFill>
                             <a:srgbClr val="000000"/>
                           </a:solidFill>
@@ -8456,7 +8381,7 @@
                         </a:lnSpc>
                       </a:pPr>
                       <a:r>
-                        <a:rPr lang="en-US" altLang="ko-KR" sz="1200" b="0" i="0" u="none" strike="noStrike" kern="1200" cap="none" dirty="0" smtClean="0">
+                        <a:rPr lang="en-US" altLang="ko-KR" sz="1200" b="0" i="0" u="none" strike="noStrike" kern="1200" cap="none" dirty="0">
                           <a:solidFill>
                             <a:srgbClr val="000000"/>
                           </a:solidFill>
@@ -8468,7 +8393,7 @@
                         <a:t>-</a:t>
                       </a:r>
                       <a:r>
-                        <a:rPr lang="en-US" altLang="ko-KR" sz="1200" b="0" i="0" u="none" strike="noStrike" kern="1200" cap="none" baseline="0" dirty="0" smtClean="0">
+                        <a:rPr lang="en-US" altLang="ko-KR" sz="1200" b="0" i="0" u="none" strike="noStrike" kern="1200" cap="none" baseline="0" dirty="0">
                           <a:solidFill>
                             <a:srgbClr val="000000"/>
                           </a:solidFill>
@@ -8480,7 +8405,7 @@
                         <a:t> </a:t>
                       </a:r>
                       <a:r>
-                        <a:rPr lang="ko-KR" altLang="en-US" sz="1200" b="0" i="0" u="none" strike="noStrike" kern="1200" cap="none" baseline="0" dirty="0" smtClean="0">
+                        <a:rPr lang="ko-KR" altLang="en-US" sz="1200" b="0" i="0" u="none" strike="noStrike" kern="1200" cap="none" baseline="0" dirty="0">
                           <a:solidFill>
                             <a:srgbClr val="000000"/>
                           </a:solidFill>
@@ -8491,7 +8416,7 @@
                         </a:rPr>
                         <a:t>내역이 있을 때는 간략한 프로젝트 정보 표시</a:t>
                       </a:r>
-                      <a:endParaRPr lang="ko-KR" altLang="en-US" sz="1200" b="0" i="0" u="none" strike="noStrike" kern="1200" cap="none" dirty="0" smtClean="0">
+                      <a:endParaRPr lang="ko-KR" altLang="en-US" sz="1200" b="0" i="0" u="none" strike="noStrike" kern="1200" cap="none" dirty="0">
                         <a:solidFill>
                           <a:srgbClr val="000000"/>
                         </a:solidFill>
@@ -8504,6 +8429,11 @@
                   </a:txBody>
                   <a:tcPr marL="121920" marR="121920" marT="60960" marB="60960"/>
                 </a:tc>
+                <a:extLst>
+                  <a:ext uri="{0D108BD9-81ED-4DB2-BD59-A6C34878D82A}">
+                    <a16:rowId xmlns:a16="http://schemas.microsoft.com/office/drawing/2014/main" val="10004"/>
+                  </a:ext>
+                </a:extLst>
               </a:tr>
             </a:tbl>
           </a:graphicData>
@@ -8552,7 +8482,7 @@
           <a:p>
             <a:pPr algn="ctr"/>
             <a:r>
-              <a:rPr lang="en-US" altLang="ko-KR" sz="1400" b="1" dirty="0" smtClean="0">
+              <a:rPr lang="en-US" altLang="ko-KR" sz="1400" b="1" dirty="0">
                 <a:solidFill>
                   <a:schemeClr val="bg1"/>
                 </a:solidFill>
@@ -8610,7 +8540,7 @@
           <a:p>
             <a:pPr algn="ctr"/>
             <a:r>
-              <a:rPr lang="en-US" altLang="ko-KR" sz="1400" b="1" dirty="0" smtClean="0">
+              <a:rPr lang="en-US" altLang="ko-KR" sz="1400" b="1" dirty="0">
                 <a:solidFill>
                   <a:schemeClr val="bg1"/>
                 </a:solidFill>
@@ -8668,7 +8598,7 @@
           <a:p>
             <a:pPr algn="ctr"/>
             <a:r>
-              <a:rPr lang="en-US" altLang="ko-KR" sz="1400" b="1" dirty="0" smtClean="0">
+              <a:rPr lang="en-US" altLang="ko-KR" sz="1400" b="1" dirty="0">
                 <a:solidFill>
                   <a:schemeClr val="bg1"/>
                 </a:solidFill>
@@ -8726,7 +8656,7 @@
           <a:p>
             <a:pPr algn="ctr"/>
             <a:r>
-              <a:rPr lang="en-US" altLang="ko-KR" sz="1400" b="1" dirty="0" smtClean="0">
+              <a:rPr lang="en-US" altLang="ko-KR" sz="1400" b="1" dirty="0">
                 <a:solidFill>
                   <a:schemeClr val="bg1"/>
                 </a:solidFill>
@@ -8901,7 +8831,7 @@
           <a:p>
             <a:pPr algn="ctr"/>
             <a:r>
-              <a:rPr lang="en-US" altLang="ko-KR" sz="1300" b="1" dirty="0" smtClean="0">
+              <a:rPr lang="en-US" altLang="ko-KR" sz="1300" b="1" dirty="0">
                 <a:solidFill>
                   <a:schemeClr val="bg1"/>
                 </a:solidFill>
@@ -8959,7 +8889,7 @@
           <a:p>
             <a:pPr algn="ctr"/>
             <a:r>
-              <a:rPr lang="en-US" altLang="ko-KR" sz="1300" b="1" dirty="0" smtClean="0">
+              <a:rPr lang="en-US" altLang="ko-KR" sz="1300" b="1" dirty="0">
                 <a:solidFill>
                   <a:schemeClr val="bg1"/>
                 </a:solidFill>
@@ -9017,7 +8947,7 @@
           <a:p>
             <a:pPr algn="ctr"/>
             <a:r>
-              <a:rPr lang="en-US" altLang="ko-KR" sz="1300" b="1" dirty="0" smtClean="0">
+              <a:rPr lang="en-US" altLang="ko-KR" sz="1300" b="1" dirty="0">
                 <a:solidFill>
                   <a:schemeClr val="bg1"/>
                 </a:solidFill>
@@ -9298,13 +9228,6 @@
   <p:clrMapOvr>
     <a:masterClrMapping/>
   </p:clrMapOvr>
-  <p:timing>
-    <p:tnLst>
-      <p:par>
-        <p:cTn id="1" dur="indefinite" restart="never" nodeType="tmRoot"/>
-      </p:par>
-    </p:tnLst>
-  </p:timing>
 </p:sld>
 </file>
 
@@ -10197,7 +10120,7 @@
               <a:t>웹 </a:t>
             </a:r>
             <a:r>
-              <a:rPr lang="en-US" altLang="ko-KR" sz="2400" b="1" dirty="0" smtClean="0">
+              <a:rPr lang="en-US" altLang="ko-KR" sz="2400" b="1" dirty="0">
                 <a:solidFill>
                   <a:schemeClr val="tx1">
                     <a:lumMod val="75000"/>
@@ -10210,7 +10133,7 @@
               <a:t>– </a:t>
             </a:r>
             <a:r>
-              <a:rPr lang="ko-KR" altLang="en-US" sz="2400" b="1" dirty="0" err="1" smtClean="0">
+              <a:rPr lang="ko-KR" altLang="en-US" sz="2400" b="1" dirty="0" err="1">
                 <a:solidFill>
                   <a:schemeClr val="tx1">
                     <a:lumMod val="75000"/>
@@ -10223,7 +10146,7 @@
               <a:t>마이페이지</a:t>
             </a:r>
             <a:r>
-              <a:rPr lang="ko-KR" altLang="en-US" sz="2400" b="1" dirty="0" smtClean="0">
+              <a:rPr lang="ko-KR" altLang="en-US" sz="2400" b="1" dirty="0">
                 <a:solidFill>
                   <a:schemeClr val="tx1">
                     <a:lumMod val="75000"/>
@@ -10236,7 +10159,7 @@
               <a:t> </a:t>
             </a:r>
             <a:r>
-              <a:rPr lang="en-US" altLang="ko-KR" b="1" dirty="0" smtClean="0">
+              <a:rPr lang="en-US" altLang="ko-KR" b="1" dirty="0">
                 <a:solidFill>
                   <a:schemeClr val="tx1">
                     <a:lumMod val="75000"/>
@@ -10249,7 +10172,7 @@
               <a:t>- </a:t>
             </a:r>
             <a:r>
-              <a:rPr lang="ko-KR" altLang="en-US" b="1" dirty="0" smtClean="0">
+              <a:rPr lang="ko-KR" altLang="en-US" b="1" dirty="0">
                 <a:solidFill>
                   <a:schemeClr val="tx1">
                     <a:lumMod val="75000"/>
@@ -10261,16 +10184,6 @@
               </a:rPr>
               <a:t>회원정보변경</a:t>
             </a:r>
-            <a:endParaRPr lang="ko-KR" altLang="en-US" b="1" dirty="0">
-              <a:solidFill>
-                <a:schemeClr val="tx1">
-                  <a:lumMod val="75000"/>
-                  <a:lumOff val="25000"/>
-                </a:schemeClr>
-              </a:solidFill>
-              <a:latin typeface="+mj-ea"/>
-              <a:ea typeface="+mj-ea"/>
-            </a:endParaRPr>
           </a:p>
         </p:txBody>
       </p:sp>
@@ -10297,7 +10210,13 @@
             <a:tbl>
               <a:tblPr firstRow="1" bandRow="1"/>
               <a:tblGrid>
-                <a:gridCol w="2688299"/>
+                <a:gridCol w="2688299">
+                  <a:extLst>
+                    <a:ext uri="{9D8B030D-6E8A-4147-A177-3AD203B41FA5}">
+                      <a16:colId xmlns:a16="http://schemas.microsoft.com/office/drawing/2014/main" val="20000"/>
+                    </a:ext>
+                  </a:extLst>
+                </a:gridCol>
               </a:tblGrid>
               <a:tr h="424495">
                 <a:tc>
@@ -10307,7 +10226,7 @@
                     <a:p>
                       <a:pPr algn="ctr" latinLnBrk="1"/>
                       <a:r>
-                        <a:rPr lang="ko-KR" altLang="en-US" sz="1200" b="1" dirty="0" smtClean="0">
+                        <a:rPr lang="ko-KR" altLang="en-US" sz="1200" b="1" dirty="0">
                           <a:solidFill>
                             <a:schemeClr val="tx1"/>
                           </a:solidFill>
@@ -10316,13 +10235,6 @@
                         </a:rPr>
                         <a:t>화면코드</a:t>
                       </a:r>
-                      <a:endParaRPr lang="ko-KR" altLang="en-US" sz="1200" b="1" dirty="0">
-                        <a:solidFill>
-                          <a:schemeClr val="tx1"/>
-                        </a:solidFill>
-                        <a:latin typeface="+mj-ea"/>
-                        <a:ea typeface="+mj-ea"/>
-                      </a:endParaRPr>
                     </a:p>
                   </a:txBody>
                   <a:tcPr marL="121920" marR="121920" marT="60960" marB="60960" anchor="ctr">
@@ -10331,6 +10243,11 @@
                     </a:solidFill>
                   </a:tcPr>
                 </a:tc>
+                <a:extLst>
+                  <a:ext uri="{0D108BD9-81ED-4DB2-BD59-A6C34878D82A}">
+                    <a16:rowId xmlns:a16="http://schemas.microsoft.com/office/drawing/2014/main" val="10000"/>
+                  </a:ext>
+                </a:extLst>
               </a:tr>
               <a:tr h="490571">
                 <a:tc>
@@ -10340,7 +10257,7 @@
                     <a:p>
                       <a:pPr algn="ctr" latinLnBrk="1"/>
                       <a:r>
-                        <a:rPr lang="en-US" altLang="ko-KR" sz="1500" dirty="0" err="1" smtClean="0">
+                        <a:rPr lang="en-US" altLang="ko-KR" sz="1500" dirty="0" err="1">
                           <a:latin typeface="+mj-ea"/>
                           <a:ea typeface="+mj-ea"/>
                         </a:rPr>
@@ -10354,6 +10271,11 @@
                   </a:txBody>
                   <a:tcPr marL="121920" marR="121920" marT="60960" marB="60960" anchor="ctr"/>
                 </a:tc>
+                <a:extLst>
+                  <a:ext uri="{0D108BD9-81ED-4DB2-BD59-A6C34878D82A}">
+                    <a16:rowId xmlns:a16="http://schemas.microsoft.com/office/drawing/2014/main" val="10001"/>
+                  </a:ext>
+                </a:extLst>
               </a:tr>
             </a:tbl>
           </a:graphicData>
@@ -10423,15 +10345,27 @@
         </p:nvGraphicFramePr>
         <p:xfrm>
           <a:off x="9168341" y="2479152"/>
-          <a:ext cx="2688299" cy="3137837"/>
+          <a:ext cx="2688299" cy="3113898"/>
         </p:xfrm>
         <a:graphic>
           <a:graphicData uri="http://schemas.openxmlformats.org/drawingml/2006/table">
             <a:tbl>
               <a:tblPr firstRow="1" bandRow="1"/>
               <a:tblGrid>
-                <a:gridCol w="280507"/>
-                <a:gridCol w="2407792"/>
+                <a:gridCol w="280507">
+                  <a:extLst>
+                    <a:ext uri="{9D8B030D-6E8A-4147-A177-3AD203B41FA5}">
+                      <a16:colId xmlns:a16="http://schemas.microsoft.com/office/drawing/2014/main" val="20000"/>
+                    </a:ext>
+                  </a:extLst>
+                </a:gridCol>
+                <a:gridCol w="2407792">
+                  <a:extLst>
+                    <a:ext uri="{9D8B030D-6E8A-4147-A177-3AD203B41FA5}">
+                      <a16:colId xmlns:a16="http://schemas.microsoft.com/office/drawing/2014/main" val="20001"/>
+                    </a:ext>
+                  </a:extLst>
+                </a:gridCol>
               </a:tblGrid>
               <a:tr h="469796">
                 <a:tc>
@@ -10445,7 +10379,7 @@
                         </a:lnSpc>
                       </a:pPr>
                       <a:r>
-                        <a:rPr lang="en-US" altLang="ko-KR" sz="1200" b="1" dirty="0" smtClean="0">
+                        <a:rPr lang="en-US" altLang="ko-KR" sz="1200" b="1" dirty="0">
                           <a:latin typeface="+mj-ea"/>
                           <a:ea typeface="+mj-ea"/>
                         </a:rPr>
@@ -10474,16 +10408,12 @@
                         </a:lnSpc>
                       </a:pPr>
                       <a:r>
-                        <a:rPr lang="ko-KR" altLang="en-US" sz="1200" b="1" dirty="0" smtClean="0">
+                        <a:rPr lang="ko-KR" altLang="en-US" sz="1200" b="1" dirty="0">
                           <a:latin typeface="+mj-ea"/>
                           <a:ea typeface="+mj-ea"/>
                         </a:rPr>
                         <a:t>기능</a:t>
                       </a:r>
-                      <a:endParaRPr lang="ko-KR" altLang="en-US" sz="1200" b="1" dirty="0">
-                        <a:latin typeface="+mj-ea"/>
-                        <a:ea typeface="+mj-ea"/>
-                      </a:endParaRPr>
                     </a:p>
                   </a:txBody>
                   <a:tcPr marL="121920" marR="121920" marT="60960" marB="60960" anchor="ctr">
@@ -10492,6 +10422,11 @@
                     </a:solidFill>
                   </a:tcPr>
                 </a:tc>
+                <a:extLst>
+                  <a:ext uri="{0D108BD9-81ED-4DB2-BD59-A6C34878D82A}">
+                    <a16:rowId xmlns:a16="http://schemas.microsoft.com/office/drawing/2014/main" val="10000"/>
+                  </a:ext>
+                </a:extLst>
               </a:tr>
               <a:tr h="620107">
                 <a:tc>
@@ -10505,7 +10440,7 @@
                         </a:lnSpc>
                       </a:pPr>
                       <a:r>
-                        <a:rPr lang="en-US" altLang="ko-KR" sz="1300" dirty="0" smtClean="0">
+                        <a:rPr lang="en-US" altLang="ko-KR" sz="1300" dirty="0">
                           <a:latin typeface="+mj-ea"/>
                           <a:ea typeface="+mj-ea"/>
                         </a:rPr>
@@ -10530,13 +10465,13 @@
                         </a:lnSpc>
                       </a:pPr>
                       <a:r>
-                        <a:rPr lang="ko-KR" altLang="en-US" sz="1200" b="1" dirty="0" smtClean="0">
+                        <a:rPr lang="ko-KR" altLang="en-US" sz="1200" b="1" dirty="0">
                           <a:latin typeface="+mj-ea"/>
                           <a:ea typeface="+mj-ea"/>
                         </a:rPr>
                         <a:t>프로필 이미지 수정</a:t>
                       </a:r>
-                      <a:endParaRPr lang="en-US" altLang="ko-KR" sz="1200" b="1" dirty="0" smtClean="0">
+                      <a:endParaRPr lang="en-US" altLang="ko-KR" sz="1200" b="1" dirty="0">
                         <a:latin typeface="+mj-ea"/>
                         <a:ea typeface="+mj-ea"/>
                       </a:endParaRPr>
@@ -10548,27 +10483,28 @@
                         </a:lnSpc>
                       </a:pPr>
                       <a:r>
-                        <a:rPr lang="en-US" altLang="ko-KR" sz="1200" dirty="0" smtClean="0">
+                        <a:rPr lang="en-US" altLang="ko-KR" sz="1200" dirty="0">
                           <a:latin typeface="+mj-ea"/>
                           <a:ea typeface="+mj-ea"/>
                         </a:rPr>
                         <a:t>- </a:t>
                       </a:r>
                       <a:r>
-                        <a:rPr lang="ko-KR" altLang="en-US" sz="1200" dirty="0" smtClean="0">
+                        <a:rPr lang="ko-KR" altLang="en-US" sz="1200" dirty="0">
                           <a:latin typeface="+mj-ea"/>
                           <a:ea typeface="+mj-ea"/>
                         </a:rPr>
                         <a:t>이미지 파일업로드</a:t>
                       </a:r>
-                      <a:endParaRPr lang="ko-KR" altLang="en-US" sz="1200" dirty="0">
-                        <a:latin typeface="+mj-ea"/>
-                        <a:ea typeface="+mj-ea"/>
-                      </a:endParaRPr>
                     </a:p>
                   </a:txBody>
                   <a:tcPr marL="121920" marR="121920" marT="60960" marB="60960"/>
                 </a:tc>
+                <a:extLst>
+                  <a:ext uri="{0D108BD9-81ED-4DB2-BD59-A6C34878D82A}">
+                    <a16:rowId xmlns:a16="http://schemas.microsoft.com/office/drawing/2014/main" val="10001"/>
+                  </a:ext>
+                </a:extLst>
               </a:tr>
               <a:tr h="620107">
                 <a:tc>
@@ -10582,7 +10518,7 @@
                         </a:lnSpc>
                       </a:pPr>
                       <a:r>
-                        <a:rPr lang="en-US" altLang="ko-KR" sz="1300" dirty="0" smtClean="0">
+                        <a:rPr lang="en-US" altLang="ko-KR" sz="1300" dirty="0">
                           <a:latin typeface="+mj-ea"/>
                           <a:ea typeface="+mj-ea"/>
                         </a:rPr>
@@ -10607,7 +10543,7 @@
                         </a:lnSpc>
                       </a:pPr>
                       <a:r>
-                        <a:rPr lang="ko-KR" altLang="en-US" sz="1200" b="1" i="0" u="none" strike="noStrike" cap="none" dirty="0" err="1" smtClean="0">
+                        <a:rPr lang="ko-KR" altLang="en-US" sz="1200" b="1" i="0" u="none" strike="noStrike" cap="none" dirty="0" err="1">
                           <a:solidFill>
                             <a:srgbClr val="000000"/>
                           </a:solidFill>
@@ -10619,7 +10555,7 @@
                         <a:t>이메일</a:t>
                       </a:r>
                       <a:r>
-                        <a:rPr lang="ko-KR" altLang="en-US" sz="1200" b="1" i="0" u="none" strike="noStrike" cap="none" dirty="0" smtClean="0">
+                        <a:rPr lang="ko-KR" altLang="en-US" sz="1200" b="1" i="0" u="none" strike="noStrike" cap="none" dirty="0">
                           <a:solidFill>
                             <a:srgbClr val="000000"/>
                           </a:solidFill>
@@ -10630,7 +10566,7 @@
                         </a:rPr>
                         <a:t> 주소 확인</a:t>
                       </a:r>
-                      <a:endParaRPr lang="en-US" altLang="ko-KR" sz="1200" b="1" i="0" u="none" strike="noStrike" cap="none" dirty="0" smtClean="0">
+                      <a:endParaRPr lang="en-US" altLang="ko-KR" sz="1200" b="1" i="0" u="none" strike="noStrike" cap="none" dirty="0">
                         <a:solidFill>
                           <a:srgbClr val="000000"/>
                         </a:solidFill>
@@ -10647,7 +10583,7 @@
                         </a:lnSpc>
                       </a:pPr>
                       <a:r>
-                        <a:rPr lang="en-US" altLang="ko-KR" sz="1200" b="0" i="0" u="none" strike="noStrike" cap="none" dirty="0" smtClean="0">
+                        <a:rPr lang="en-US" altLang="ko-KR" sz="1200" b="0" i="0" u="none" strike="noStrike" cap="none" dirty="0">
                           <a:solidFill>
                             <a:srgbClr val="000000"/>
                           </a:solidFill>
@@ -10659,7 +10595,7 @@
                         <a:t>- </a:t>
                       </a:r>
                       <a:r>
-                        <a:rPr lang="ko-KR" altLang="en-US" sz="1200" b="0" i="0" u="none" strike="noStrike" cap="none" dirty="0" smtClean="0">
+                        <a:rPr lang="ko-KR" altLang="en-US" sz="1200" b="0" i="0" u="none" strike="noStrike" cap="none" dirty="0">
                           <a:solidFill>
                             <a:srgbClr val="000000"/>
                           </a:solidFill>
@@ -10670,19 +10606,15 @@
                         </a:rPr>
                         <a:t>수정 불가</a:t>
                       </a:r>
-                      <a:endParaRPr lang="ko-KR" altLang="en-US" sz="1200" b="0" i="0" u="none" strike="noStrike" cap="none" dirty="0" smtClean="0">
-                        <a:solidFill>
-                          <a:srgbClr val="000000"/>
-                        </a:solidFill>
-                        <a:latin typeface="+mj-ea"/>
-                        <a:ea typeface="+mj-ea"/>
-                        <a:cs typeface="Arial"/>
-                        <a:sym typeface="Arial"/>
-                      </a:endParaRPr>
                     </a:p>
                   </a:txBody>
                   <a:tcPr marL="121920" marR="121920" marT="60960" marB="60960"/>
                 </a:tc>
+                <a:extLst>
+                  <a:ext uri="{0D108BD9-81ED-4DB2-BD59-A6C34878D82A}">
+                    <a16:rowId xmlns:a16="http://schemas.microsoft.com/office/drawing/2014/main" val="10002"/>
+                  </a:ext>
+                </a:extLst>
               </a:tr>
               <a:tr h="620107">
                 <a:tc>
@@ -10696,7 +10628,7 @@
                         </a:lnSpc>
                       </a:pPr>
                       <a:r>
-                        <a:rPr lang="en-US" altLang="ko-KR" sz="1300" dirty="0" smtClean="0">
+                        <a:rPr lang="en-US" altLang="ko-KR" sz="1300" dirty="0">
                           <a:latin typeface="+mj-ea"/>
                           <a:ea typeface="+mj-ea"/>
                         </a:rPr>
@@ -10721,7 +10653,7 @@
                         </a:lnSpc>
                       </a:pPr>
                       <a:r>
-                        <a:rPr lang="ko-KR" altLang="en-US" sz="1200" b="1" i="0" u="none" strike="noStrike" kern="1200" cap="none" dirty="0" smtClean="0">
+                        <a:rPr lang="ko-KR" altLang="en-US" sz="1200" b="1" i="0" u="none" strike="noStrike" kern="1200" cap="none" dirty="0">
                           <a:solidFill>
                             <a:srgbClr val="000000"/>
                           </a:solidFill>
@@ -10732,7 +10664,7 @@
                         </a:rPr>
                         <a:t>닉네임 변경</a:t>
                       </a:r>
-                      <a:endParaRPr lang="en-US" altLang="ko-KR" sz="1200" b="1" i="0" u="none" strike="noStrike" kern="1200" cap="none" dirty="0" smtClean="0">
+                      <a:endParaRPr lang="en-US" altLang="ko-KR" sz="1200" b="1" i="0" u="none" strike="noStrike" kern="1200" cap="none" dirty="0">
                         <a:solidFill>
                           <a:srgbClr val="000000"/>
                         </a:solidFill>
@@ -10749,7 +10681,7 @@
                         </a:lnSpc>
                       </a:pPr>
                       <a:r>
-                        <a:rPr lang="en-US" altLang="ko-KR" sz="1200" b="0" i="0" u="none" strike="noStrike" kern="1200" cap="none" dirty="0" smtClean="0">
+                        <a:rPr lang="en-US" altLang="ko-KR" sz="1200" b="0" i="0" u="none" strike="noStrike" kern="1200" cap="none" dirty="0">
                           <a:solidFill>
                             <a:srgbClr val="000000"/>
                           </a:solidFill>
@@ -10761,7 +10693,7 @@
                         <a:t>- </a:t>
                       </a:r>
                       <a:r>
-                        <a:rPr lang="ko-KR" altLang="en-US" sz="1200" b="0" i="0" u="none" strike="noStrike" kern="1200" cap="none" dirty="0" smtClean="0">
+                        <a:rPr lang="ko-KR" altLang="en-US" sz="1200" b="0" i="0" u="none" strike="noStrike" kern="1200" cap="none" dirty="0">
                           <a:solidFill>
                             <a:srgbClr val="000000"/>
                           </a:solidFill>
@@ -10773,7 +10705,7 @@
                         <a:t>데이터베이스 존재 여부 </a:t>
                       </a:r>
                       <a:r>
-                        <a:rPr lang="en-US" altLang="ko-KR" sz="1200" b="0" i="0" u="none" strike="noStrike" kern="1200" cap="none" dirty="0" smtClean="0">
+                        <a:rPr lang="en-US" altLang="ko-KR" sz="1200" b="0" i="0" u="none" strike="noStrike" kern="1200" cap="none" dirty="0">
                           <a:solidFill>
                             <a:srgbClr val="000000"/>
                           </a:solidFill>
@@ -10785,7 +10717,7 @@
                         <a:t>Ajax</a:t>
                       </a:r>
                       <a:r>
-                        <a:rPr lang="ko-KR" altLang="en-US" sz="1200" b="0" i="0" u="none" strike="noStrike" kern="1200" cap="none" dirty="0" smtClean="0">
+                        <a:rPr lang="ko-KR" altLang="en-US" sz="1200" b="0" i="0" u="none" strike="noStrike" kern="1200" cap="none" dirty="0">
                           <a:solidFill>
                             <a:srgbClr val="000000"/>
                           </a:solidFill>
@@ -10796,7 +10728,7 @@
                         </a:rPr>
                         <a:t>로 체크</a:t>
                       </a:r>
-                      <a:endParaRPr lang="ko-KR" altLang="en-US" sz="1200" b="0" i="0" u="none" strike="noStrike" kern="1200" cap="none" baseline="0" dirty="0" smtClean="0">
+                      <a:endParaRPr lang="ko-KR" altLang="en-US" sz="1200" b="0" i="0" u="none" strike="noStrike" kern="1200" cap="none" baseline="0" dirty="0">
                         <a:solidFill>
                           <a:srgbClr val="000000"/>
                         </a:solidFill>
@@ -10809,6 +10741,11 @@
                   </a:txBody>
                   <a:tcPr marL="121920" marR="121920" marT="60960" marB="60960"/>
                 </a:tc>
+                <a:extLst>
+                  <a:ext uri="{0D108BD9-81ED-4DB2-BD59-A6C34878D82A}">
+                    <a16:rowId xmlns:a16="http://schemas.microsoft.com/office/drawing/2014/main" val="10003"/>
+                  </a:ext>
+                </a:extLst>
               </a:tr>
               <a:tr h="620107">
                 <a:tc>
@@ -10822,7 +10759,7 @@
                         </a:lnSpc>
                       </a:pPr>
                       <a:r>
-                        <a:rPr lang="en-US" altLang="ko-KR" sz="1300" dirty="0" smtClean="0">
+                        <a:rPr lang="en-US" altLang="ko-KR" sz="1300" dirty="0">
                           <a:latin typeface="+mj-ea"/>
                           <a:ea typeface="+mj-ea"/>
                         </a:rPr>
@@ -10847,7 +10784,7 @@
                         </a:lnSpc>
                       </a:pPr>
                       <a:r>
-                        <a:rPr lang="ko-KR" altLang="en-US" sz="1200" b="1" i="0" u="none" strike="noStrike" kern="1200" cap="none" dirty="0" smtClean="0">
+                        <a:rPr lang="ko-KR" altLang="en-US" sz="1200" b="1" i="0" u="none" strike="noStrike" kern="1200" cap="none" dirty="0">
                           <a:solidFill>
                             <a:srgbClr val="000000"/>
                           </a:solidFill>
@@ -10859,7 +10796,7 @@
                         <a:t>휴대폰 인증 </a:t>
                       </a:r>
                       <a:r>
-                        <a:rPr lang="en-US" altLang="ko-KR" sz="1200" b="1" i="0" u="none" strike="noStrike" kern="1200" cap="none" dirty="0" smtClean="0">
+                        <a:rPr lang="en-US" altLang="ko-KR" sz="1200" b="1" i="0" u="none" strike="noStrike" kern="1200" cap="none" dirty="0">
                           <a:solidFill>
                             <a:srgbClr val="000000"/>
                           </a:solidFill>
@@ -10871,7 +10808,7 @@
                         <a:t>/ </a:t>
                       </a:r>
                       <a:r>
-                        <a:rPr lang="ko-KR" altLang="en-US" sz="1200" b="1" i="0" u="none" strike="noStrike" kern="1200" cap="none" dirty="0" smtClean="0">
+                        <a:rPr lang="ko-KR" altLang="en-US" sz="1200" b="1" i="0" u="none" strike="noStrike" kern="1200" cap="none" dirty="0">
                           <a:solidFill>
                             <a:srgbClr val="000000"/>
                           </a:solidFill>
@@ -10882,7 +10819,7 @@
                         </a:rPr>
                         <a:t>주소 검색</a:t>
                       </a:r>
-                      <a:endParaRPr lang="en-US" altLang="ko-KR" sz="1200" b="1" i="0" u="none" strike="noStrike" kern="1200" cap="none" dirty="0" smtClean="0">
+                      <a:endParaRPr lang="en-US" altLang="ko-KR" sz="1200" b="1" i="0" u="none" strike="noStrike" kern="1200" cap="none" dirty="0">
                         <a:solidFill>
                           <a:srgbClr val="000000"/>
                         </a:solidFill>
@@ -10899,7 +10836,7 @@
                         </a:lnSpc>
                       </a:pPr>
                       <a:r>
-                        <a:rPr lang="en-US" altLang="ko-KR" sz="1200" b="0" i="0" u="none" strike="noStrike" kern="1200" cap="none" dirty="0" smtClean="0">
+                        <a:rPr lang="en-US" altLang="ko-KR" sz="1200" b="0" i="0" u="none" strike="noStrike" kern="1200" cap="none" dirty="0">
                           <a:solidFill>
                             <a:srgbClr val="000000"/>
                           </a:solidFill>
@@ -10911,7 +10848,7 @@
                         <a:t>-</a:t>
                       </a:r>
                       <a:r>
-                        <a:rPr lang="en-US" altLang="ko-KR" sz="1200" b="0" i="0" u="none" strike="noStrike" kern="1200" cap="none" baseline="0" dirty="0" smtClean="0">
+                        <a:rPr lang="en-US" altLang="ko-KR" sz="1200" b="0" i="0" u="none" strike="noStrike" kern="1200" cap="none" baseline="0" dirty="0">
                           <a:solidFill>
                             <a:srgbClr val="000000"/>
                           </a:solidFill>
@@ -10923,7 +10860,7 @@
                         <a:t> </a:t>
                       </a:r>
                       <a:r>
-                        <a:rPr lang="ko-KR" altLang="en-US" sz="1200" b="0" i="0" u="none" strike="noStrike" kern="1200" cap="none" baseline="0" dirty="0" smtClean="0">
+                        <a:rPr lang="ko-KR" altLang="en-US" sz="1200" b="0" i="0" u="none" strike="noStrike" kern="1200" cap="none" baseline="0" dirty="0">
                           <a:solidFill>
                             <a:srgbClr val="000000"/>
                           </a:solidFill>
@@ -10935,7 +10872,7 @@
                         <a:t>유효성 </a:t>
                       </a:r>
                       <a:r>
-                        <a:rPr lang="ko-KR" altLang="en-US" sz="1200" b="0" i="0" u="none" strike="noStrike" kern="1200" cap="none" baseline="0" dirty="0" err="1" smtClean="0">
+                        <a:rPr lang="ko-KR" altLang="en-US" sz="1200" b="0" i="0" u="none" strike="noStrike" kern="1200" cap="none" baseline="0" dirty="0" err="1">
                           <a:solidFill>
                             <a:srgbClr val="000000"/>
                           </a:solidFill>
@@ -10947,7 +10884,7 @@
                         <a:t>확인시</a:t>
                       </a:r>
                       <a:r>
-                        <a:rPr lang="ko-KR" altLang="en-US" sz="1200" b="0" i="0" u="none" strike="noStrike" kern="1200" cap="none" baseline="0" dirty="0" smtClean="0">
+                        <a:rPr lang="ko-KR" altLang="en-US" sz="1200" b="0" i="0" u="none" strike="noStrike" kern="1200" cap="none" baseline="0" dirty="0">
                           <a:solidFill>
                             <a:srgbClr val="000000"/>
                           </a:solidFill>
@@ -10966,6 +10903,11 @@
                   </a:txBody>
                   <a:tcPr marL="121920" marR="121920" marT="60960" marB="60960"/>
                 </a:tc>
+                <a:extLst>
+                  <a:ext uri="{0D108BD9-81ED-4DB2-BD59-A6C34878D82A}">
+                    <a16:rowId xmlns:a16="http://schemas.microsoft.com/office/drawing/2014/main" val="10004"/>
+                  </a:ext>
+                </a:extLst>
               </a:tr>
             </a:tbl>
           </a:graphicData>
@@ -11078,7 +11020,7 @@
           <a:p>
             <a:pPr algn="ctr"/>
             <a:r>
-              <a:rPr lang="en-US" altLang="ko-KR" sz="1300" b="1" dirty="0" smtClean="0">
+              <a:rPr lang="en-US" altLang="ko-KR" sz="1300" b="1" dirty="0">
                 <a:solidFill>
                   <a:schemeClr val="bg1"/>
                 </a:solidFill>
@@ -11136,7 +11078,7 @@
           <a:p>
             <a:pPr algn="ctr"/>
             <a:r>
-              <a:rPr lang="en-US" altLang="ko-KR" sz="1300" b="1" dirty="0" smtClean="0">
+              <a:rPr lang="en-US" altLang="ko-KR" sz="1300" b="1" dirty="0">
                 <a:solidFill>
                   <a:schemeClr val="bg1"/>
                 </a:solidFill>
@@ -11386,7 +11328,7 @@
           <a:p>
             <a:pPr algn="ctr"/>
             <a:r>
-              <a:rPr lang="en-US" altLang="ko-KR" sz="1300" b="1" dirty="0" smtClean="0">
+              <a:rPr lang="en-US" altLang="ko-KR" sz="1300" b="1" dirty="0">
                 <a:solidFill>
                   <a:schemeClr val="bg1"/>
                 </a:solidFill>
@@ -11444,7 +11386,7 @@
           <a:p>
             <a:pPr algn="ctr"/>
             <a:r>
-              <a:rPr lang="en-US" altLang="ko-KR" sz="1300" b="1" dirty="0" smtClean="0">
+              <a:rPr lang="en-US" altLang="ko-KR" sz="1300" b="1" dirty="0">
                 <a:solidFill>
                   <a:schemeClr val="bg1"/>
                 </a:solidFill>
@@ -11502,7 +11444,7 @@
           <a:p>
             <a:pPr algn="ctr"/>
             <a:r>
-              <a:rPr lang="en-US" altLang="ko-KR" sz="1300" b="1" dirty="0" smtClean="0">
+              <a:rPr lang="en-US" altLang="ko-KR" sz="1300" b="1" dirty="0">
                 <a:solidFill>
                   <a:schemeClr val="bg1"/>
                 </a:solidFill>
@@ -11560,7 +11502,7 @@
           <a:p>
             <a:pPr algn="ctr"/>
             <a:r>
-              <a:rPr lang="en-US" altLang="ko-KR" sz="1300" b="1" dirty="0" smtClean="0">
+              <a:rPr lang="en-US" altLang="ko-KR" sz="1300" b="1" dirty="0">
                 <a:solidFill>
                   <a:schemeClr val="bg1"/>
                 </a:solidFill>
@@ -11713,13 +11655,6 @@
   <p:clrMapOvr>
     <a:masterClrMapping/>
   </p:clrMapOvr>
-  <p:timing>
-    <p:tnLst>
-      <p:par>
-        <p:cTn id="1" dur="indefinite" restart="never" nodeType="tmRoot"/>
-      </p:par>
-    </p:tnLst>
-  </p:timing>
 </p:sld>
 </file>
 
@@ -12612,7 +12547,7 @@
               <a:t>웹 </a:t>
             </a:r>
             <a:r>
-              <a:rPr lang="en-US" altLang="ko-KR" sz="2400" b="1" dirty="0" smtClean="0">
+              <a:rPr lang="en-US" altLang="ko-KR" sz="2400" b="1" dirty="0">
                 <a:solidFill>
                   <a:schemeClr val="tx1">
                     <a:lumMod val="75000"/>
@@ -12625,7 +12560,7 @@
               <a:t>– </a:t>
             </a:r>
             <a:r>
-              <a:rPr lang="ko-KR" altLang="en-US" sz="2400" b="1" dirty="0" err="1" smtClean="0">
+              <a:rPr lang="ko-KR" altLang="en-US" sz="2400" b="1" dirty="0" err="1">
                 <a:solidFill>
                   <a:schemeClr val="tx1">
                     <a:lumMod val="75000"/>
@@ -12638,7 +12573,7 @@
               <a:t>마이페이지</a:t>
             </a:r>
             <a:r>
-              <a:rPr lang="ko-KR" altLang="en-US" sz="2400" b="1" dirty="0" smtClean="0">
+              <a:rPr lang="ko-KR" altLang="en-US" sz="2400" b="1" dirty="0">
                 <a:solidFill>
                   <a:schemeClr val="tx1">
                     <a:lumMod val="75000"/>
@@ -12651,7 +12586,7 @@
               <a:t> </a:t>
             </a:r>
             <a:r>
-              <a:rPr lang="en-US" altLang="ko-KR" b="1" dirty="0" smtClean="0">
+              <a:rPr lang="en-US" altLang="ko-KR" b="1" dirty="0">
                 <a:solidFill>
                   <a:schemeClr val="tx1">
                     <a:lumMod val="75000"/>
@@ -12664,7 +12599,7 @@
               <a:t>- </a:t>
             </a:r>
             <a:r>
-              <a:rPr lang="ko-KR" altLang="en-US" b="1" dirty="0" smtClean="0">
+              <a:rPr lang="ko-KR" altLang="en-US" b="1" dirty="0">
                 <a:solidFill>
                   <a:schemeClr val="tx1">
                     <a:lumMod val="75000"/>
@@ -12676,16 +12611,6 @@
               </a:rPr>
               <a:t>회원정보변경</a:t>
             </a:r>
-            <a:endParaRPr lang="ko-KR" altLang="en-US" b="1" dirty="0">
-              <a:solidFill>
-                <a:schemeClr val="tx1">
-                  <a:lumMod val="75000"/>
-                  <a:lumOff val="25000"/>
-                </a:schemeClr>
-              </a:solidFill>
-              <a:latin typeface="+mj-ea"/>
-              <a:ea typeface="+mj-ea"/>
-            </a:endParaRPr>
           </a:p>
         </p:txBody>
       </p:sp>
@@ -12712,7 +12637,13 @@
             <a:tbl>
               <a:tblPr firstRow="1" bandRow="1"/>
               <a:tblGrid>
-                <a:gridCol w="2688299"/>
+                <a:gridCol w="2688299">
+                  <a:extLst>
+                    <a:ext uri="{9D8B030D-6E8A-4147-A177-3AD203B41FA5}">
+                      <a16:colId xmlns:a16="http://schemas.microsoft.com/office/drawing/2014/main" val="20000"/>
+                    </a:ext>
+                  </a:extLst>
+                </a:gridCol>
               </a:tblGrid>
               <a:tr h="424495">
                 <a:tc>
@@ -12722,7 +12653,7 @@
                     <a:p>
                       <a:pPr algn="ctr" latinLnBrk="1"/>
                       <a:r>
-                        <a:rPr lang="ko-KR" altLang="en-US" sz="1200" b="1" dirty="0" smtClean="0">
+                        <a:rPr lang="ko-KR" altLang="en-US" sz="1200" b="1" dirty="0">
                           <a:solidFill>
                             <a:schemeClr val="tx1"/>
                           </a:solidFill>
@@ -12731,13 +12662,6 @@
                         </a:rPr>
                         <a:t>화면코드</a:t>
                       </a:r>
-                      <a:endParaRPr lang="ko-KR" altLang="en-US" sz="1200" b="1" dirty="0">
-                        <a:solidFill>
-                          <a:schemeClr val="tx1"/>
-                        </a:solidFill>
-                        <a:latin typeface="+mj-ea"/>
-                        <a:ea typeface="+mj-ea"/>
-                      </a:endParaRPr>
                     </a:p>
                   </a:txBody>
                   <a:tcPr marL="121920" marR="121920" marT="60960" marB="60960" anchor="ctr">
@@ -12746,6 +12670,11 @@
                     </a:solidFill>
                   </a:tcPr>
                 </a:tc>
+                <a:extLst>
+                  <a:ext uri="{0D108BD9-81ED-4DB2-BD59-A6C34878D82A}">
+                    <a16:rowId xmlns:a16="http://schemas.microsoft.com/office/drawing/2014/main" val="10000"/>
+                  </a:ext>
+                </a:extLst>
               </a:tr>
               <a:tr h="490571">
                 <a:tc>
@@ -12755,7 +12684,7 @@
                     <a:p>
                       <a:pPr algn="ctr" latinLnBrk="1"/>
                       <a:r>
-                        <a:rPr lang="en-US" altLang="ko-KR" sz="1500" kern="1200" dirty="0" err="1" smtClean="0">
+                        <a:rPr lang="en-US" altLang="ko-KR" sz="1500" kern="1200" dirty="0" err="1">
                           <a:solidFill>
                             <a:schemeClr val="tx1"/>
                           </a:solidFill>
@@ -12773,6 +12702,11 @@
                   </a:txBody>
                   <a:tcPr marL="121920" marR="121920" marT="60960" marB="60960" anchor="ctr"/>
                 </a:tc>
+                <a:extLst>
+                  <a:ext uri="{0D108BD9-81ED-4DB2-BD59-A6C34878D82A}">
+                    <a16:rowId xmlns:a16="http://schemas.microsoft.com/office/drawing/2014/main" val="10001"/>
+                  </a:ext>
+                </a:extLst>
               </a:tr>
             </a:tbl>
           </a:graphicData>
@@ -12849,8 +12783,20 @@
             <a:tbl>
               <a:tblPr firstRow="1" bandRow="1"/>
               <a:tblGrid>
-                <a:gridCol w="280507"/>
-                <a:gridCol w="2407792"/>
+                <a:gridCol w="280507">
+                  <a:extLst>
+                    <a:ext uri="{9D8B030D-6E8A-4147-A177-3AD203B41FA5}">
+                      <a16:colId xmlns:a16="http://schemas.microsoft.com/office/drawing/2014/main" val="20000"/>
+                    </a:ext>
+                  </a:extLst>
+                </a:gridCol>
+                <a:gridCol w="2407792">
+                  <a:extLst>
+                    <a:ext uri="{9D8B030D-6E8A-4147-A177-3AD203B41FA5}">
+                      <a16:colId xmlns:a16="http://schemas.microsoft.com/office/drawing/2014/main" val="20001"/>
+                    </a:ext>
+                  </a:extLst>
+                </a:gridCol>
               </a:tblGrid>
               <a:tr h="469796">
                 <a:tc>
@@ -12864,7 +12810,7 @@
                         </a:lnSpc>
                       </a:pPr>
                       <a:r>
-                        <a:rPr lang="en-US" altLang="ko-KR" sz="1200" b="1" dirty="0" smtClean="0">
+                        <a:rPr lang="en-US" altLang="ko-KR" sz="1200" b="1" dirty="0">
                           <a:latin typeface="+mj-ea"/>
                           <a:ea typeface="+mj-ea"/>
                         </a:rPr>
@@ -12893,16 +12839,12 @@
                         </a:lnSpc>
                       </a:pPr>
                       <a:r>
-                        <a:rPr lang="ko-KR" altLang="en-US" sz="1200" b="1" dirty="0" smtClean="0">
+                        <a:rPr lang="ko-KR" altLang="en-US" sz="1200" b="1" dirty="0">
                           <a:latin typeface="+mj-ea"/>
                           <a:ea typeface="+mj-ea"/>
                         </a:rPr>
                         <a:t>기능</a:t>
                       </a:r>
-                      <a:endParaRPr lang="ko-KR" altLang="en-US" sz="1200" b="1" dirty="0">
-                        <a:latin typeface="+mj-ea"/>
-                        <a:ea typeface="+mj-ea"/>
-                      </a:endParaRPr>
                     </a:p>
                   </a:txBody>
                   <a:tcPr marL="121920" marR="121920" marT="60960" marB="60960" anchor="ctr">
@@ -12911,6 +12853,11 @@
                     </a:solidFill>
                   </a:tcPr>
                 </a:tc>
+                <a:extLst>
+                  <a:ext uri="{0D108BD9-81ED-4DB2-BD59-A6C34878D82A}">
+                    <a16:rowId xmlns:a16="http://schemas.microsoft.com/office/drawing/2014/main" val="10000"/>
+                  </a:ext>
+                </a:extLst>
               </a:tr>
               <a:tr h="620107">
                 <a:tc>
@@ -12924,7 +12871,7 @@
                         </a:lnSpc>
                       </a:pPr>
                       <a:r>
-                        <a:rPr lang="en-US" altLang="ko-KR" sz="1300" dirty="0" smtClean="0">
+                        <a:rPr lang="en-US" altLang="ko-KR" sz="1300" dirty="0">
                           <a:latin typeface="+mj-ea"/>
                           <a:ea typeface="+mj-ea"/>
                         </a:rPr>
@@ -12949,13 +12896,13 @@
                         </a:lnSpc>
                       </a:pPr>
                       <a:r>
-                        <a:rPr lang="ko-KR" altLang="en-US" sz="1200" b="1" dirty="0" smtClean="0">
+                        <a:rPr lang="ko-KR" altLang="en-US" sz="1200" b="1" dirty="0">
                           <a:latin typeface="+mj-ea"/>
                           <a:ea typeface="+mj-ea"/>
                         </a:rPr>
                         <a:t>관심사 등록</a:t>
                       </a:r>
-                      <a:endParaRPr lang="en-US" altLang="ko-KR" sz="1200" b="1" dirty="0" smtClean="0">
+                      <a:endParaRPr lang="en-US" altLang="ko-KR" sz="1200" b="1" dirty="0">
                         <a:latin typeface="+mj-ea"/>
                         <a:ea typeface="+mj-ea"/>
                       </a:endParaRPr>
@@ -12969,27 +12916,27 @@
                         <a:buChar char="-"/>
                       </a:pPr>
                       <a:r>
-                        <a:rPr lang="ko-KR" altLang="en-US" sz="1200" dirty="0" smtClean="0">
+                        <a:rPr lang="ko-KR" altLang="en-US" sz="1200" dirty="0">
                           <a:latin typeface="+mj-ea"/>
                           <a:ea typeface="+mj-ea"/>
                         </a:rPr>
                         <a:t>최소 </a:t>
                       </a:r>
                       <a:r>
-                        <a:rPr lang="en-US" altLang="ko-KR" sz="1200" dirty="0" smtClean="0">
+                        <a:rPr lang="en-US" altLang="ko-KR" sz="1200" dirty="0">
                           <a:latin typeface="+mj-ea"/>
                           <a:ea typeface="+mj-ea"/>
                         </a:rPr>
                         <a:t>1</a:t>
                       </a:r>
                       <a:r>
-                        <a:rPr lang="ko-KR" altLang="en-US" sz="1200" dirty="0" smtClean="0">
+                        <a:rPr lang="ko-KR" altLang="en-US" sz="1200" dirty="0">
                           <a:latin typeface="+mj-ea"/>
                           <a:ea typeface="+mj-ea"/>
                         </a:rPr>
                         <a:t>개 이상 등록</a:t>
                       </a:r>
-                      <a:endParaRPr lang="en-US" altLang="ko-KR" sz="1200" dirty="0" smtClean="0">
+                      <a:endParaRPr lang="en-US" altLang="ko-KR" sz="1200" dirty="0">
                         <a:latin typeface="+mj-ea"/>
                         <a:ea typeface="+mj-ea"/>
                       </a:endParaRPr>
@@ -13003,34 +12950,35 @@
                         <a:buChar char="-"/>
                       </a:pPr>
                       <a:r>
-                        <a:rPr lang="ko-KR" altLang="en-US" sz="1200" dirty="0" smtClean="0">
+                        <a:rPr lang="ko-KR" altLang="en-US" sz="1200" dirty="0">
                           <a:latin typeface="+mj-ea"/>
                           <a:ea typeface="+mj-ea"/>
                         </a:rPr>
                         <a:t>해당 카테고리의 프로젝트 </a:t>
                       </a:r>
                       <a:r>
-                        <a:rPr lang="ko-KR" altLang="en-US" sz="1200" dirty="0" err="1" smtClean="0">
+                        <a:rPr lang="ko-KR" altLang="en-US" sz="1200" dirty="0" err="1">
                           <a:latin typeface="+mj-ea"/>
                           <a:ea typeface="+mj-ea"/>
                         </a:rPr>
                         <a:t>등록시</a:t>
                       </a:r>
                       <a:r>
-                        <a:rPr lang="ko-KR" altLang="en-US" sz="1200" dirty="0" smtClean="0">
+                        <a:rPr lang="ko-KR" altLang="en-US" sz="1200" dirty="0">
                           <a:latin typeface="+mj-ea"/>
                           <a:ea typeface="+mj-ea"/>
                         </a:rPr>
                         <a:t> 알림</a:t>
                       </a:r>
-                      <a:endParaRPr lang="ko-KR" altLang="en-US" sz="1200" dirty="0">
-                        <a:latin typeface="+mj-ea"/>
-                        <a:ea typeface="+mj-ea"/>
-                      </a:endParaRPr>
                     </a:p>
                   </a:txBody>
                   <a:tcPr marL="121920" marR="121920" marT="60960" marB="60960"/>
                 </a:tc>
+                <a:extLst>
+                  <a:ext uri="{0D108BD9-81ED-4DB2-BD59-A6C34878D82A}">
+                    <a16:rowId xmlns:a16="http://schemas.microsoft.com/office/drawing/2014/main" val="10001"/>
+                  </a:ext>
+                </a:extLst>
               </a:tr>
             </a:tbl>
           </a:graphicData>
@@ -13143,7 +13091,7 @@
           <a:p>
             <a:pPr algn="ctr"/>
             <a:r>
-              <a:rPr lang="en-US" altLang="ko-KR" sz="1300" b="1" dirty="0" smtClean="0">
+              <a:rPr lang="en-US" altLang="ko-KR" sz="1300" b="1" dirty="0">
                 <a:solidFill>
                   <a:schemeClr val="bg1"/>
                 </a:solidFill>
@@ -13201,7 +13149,7 @@
           <a:p>
             <a:pPr algn="ctr"/>
             <a:r>
-              <a:rPr lang="en-US" altLang="ko-KR" sz="1300" b="1" dirty="0" smtClean="0">
+              <a:rPr lang="en-US" altLang="ko-KR" sz="1300" b="1" dirty="0">
                 <a:solidFill>
                   <a:schemeClr val="bg1"/>
                 </a:solidFill>
@@ -13451,7 +13399,7 @@
           <a:p>
             <a:pPr algn="ctr"/>
             <a:r>
-              <a:rPr lang="en-US" altLang="ko-KR" sz="1300" b="1" dirty="0" smtClean="0">
+              <a:rPr lang="en-US" altLang="ko-KR" sz="1300" b="1" dirty="0">
                 <a:solidFill>
                   <a:schemeClr val="bg1"/>
                 </a:solidFill>
@@ -13796,13 +13744,6 @@
   <p:clrMapOvr>
     <a:masterClrMapping/>
   </p:clrMapOvr>
-  <p:timing>
-    <p:tnLst>
-      <p:par>
-        <p:cTn id="1" dur="indefinite" restart="never" nodeType="tmRoot"/>
-      </p:par>
-    </p:tnLst>
-  </p:timing>
 </p:sld>
 </file>
 
@@ -14695,7 +14636,7 @@
               <a:t>웹 </a:t>
             </a:r>
             <a:r>
-              <a:rPr lang="en-US" altLang="ko-KR" sz="2400" b="1" dirty="0" smtClean="0">
+              <a:rPr lang="en-US" altLang="ko-KR" sz="2400" b="1" dirty="0">
                 <a:solidFill>
                   <a:schemeClr val="tx1">
                     <a:lumMod val="75000"/>
@@ -14708,7 +14649,7 @@
               <a:t>– </a:t>
             </a:r>
             <a:r>
-              <a:rPr lang="ko-KR" altLang="en-US" sz="2400" b="1" dirty="0" err="1" smtClean="0">
+              <a:rPr lang="ko-KR" altLang="en-US" sz="2400" b="1" dirty="0" err="1">
                 <a:solidFill>
                   <a:schemeClr val="tx1">
                     <a:lumMod val="75000"/>
@@ -14721,7 +14662,7 @@
               <a:t>마이페이지</a:t>
             </a:r>
             <a:r>
-              <a:rPr lang="ko-KR" altLang="en-US" sz="2400" b="1" dirty="0" smtClean="0">
+              <a:rPr lang="ko-KR" altLang="en-US" sz="2400" b="1" dirty="0">
                 <a:solidFill>
                   <a:schemeClr val="tx1">
                     <a:lumMod val="75000"/>
@@ -14734,7 +14675,7 @@
               <a:t> </a:t>
             </a:r>
             <a:r>
-              <a:rPr lang="en-US" altLang="ko-KR" b="1" dirty="0" smtClean="0">
+              <a:rPr lang="en-US" altLang="ko-KR" b="1" dirty="0">
                 <a:solidFill>
                   <a:schemeClr val="tx1">
                     <a:lumMod val="75000"/>
@@ -14747,7 +14688,7 @@
               <a:t>- </a:t>
             </a:r>
             <a:r>
-              <a:rPr lang="ko-KR" altLang="en-US" b="1" dirty="0" smtClean="0">
+              <a:rPr lang="ko-KR" altLang="en-US" b="1" dirty="0">
                 <a:solidFill>
                   <a:schemeClr val="tx1">
                     <a:lumMod val="75000"/>
@@ -14757,18 +14698,8 @@
                 <a:latin typeface="+mj-ea"/>
                 <a:ea typeface="+mj-ea"/>
               </a:rPr>
-              <a:t>회원정보변경</a:t>
+              <a:t>탈퇴</a:t>
             </a:r>
-            <a:endParaRPr lang="ko-KR" altLang="en-US" b="1" dirty="0">
-              <a:solidFill>
-                <a:schemeClr val="tx1">
-                  <a:lumMod val="75000"/>
-                  <a:lumOff val="25000"/>
-                </a:schemeClr>
-              </a:solidFill>
-              <a:latin typeface="+mj-ea"/>
-              <a:ea typeface="+mj-ea"/>
-            </a:endParaRPr>
           </a:p>
         </p:txBody>
       </p:sp>
@@ -14795,7 +14726,13 @@
             <a:tbl>
               <a:tblPr firstRow="1" bandRow="1"/>
               <a:tblGrid>
-                <a:gridCol w="2688299"/>
+                <a:gridCol w="2688299">
+                  <a:extLst>
+                    <a:ext uri="{9D8B030D-6E8A-4147-A177-3AD203B41FA5}">
+                      <a16:colId xmlns:a16="http://schemas.microsoft.com/office/drawing/2014/main" val="20000"/>
+                    </a:ext>
+                  </a:extLst>
+                </a:gridCol>
               </a:tblGrid>
               <a:tr h="424495">
                 <a:tc>
@@ -14805,7 +14742,7 @@
                     <a:p>
                       <a:pPr algn="ctr" latinLnBrk="1"/>
                       <a:r>
-                        <a:rPr lang="ko-KR" altLang="en-US" sz="1200" b="1" dirty="0" smtClean="0">
+                        <a:rPr lang="ko-KR" altLang="en-US" sz="1200" b="1" dirty="0">
                           <a:solidFill>
                             <a:schemeClr val="tx1"/>
                           </a:solidFill>
@@ -14814,13 +14751,6 @@
                         </a:rPr>
                         <a:t>화면코드</a:t>
                       </a:r>
-                      <a:endParaRPr lang="ko-KR" altLang="en-US" sz="1200" b="1" dirty="0">
-                        <a:solidFill>
-                          <a:schemeClr val="tx1"/>
-                        </a:solidFill>
-                        <a:latin typeface="+mj-ea"/>
-                        <a:ea typeface="+mj-ea"/>
-                      </a:endParaRPr>
                     </a:p>
                   </a:txBody>
                   <a:tcPr marL="121920" marR="121920" marT="60960" marB="60960" anchor="ctr">
@@ -14829,6 +14759,11 @@
                     </a:solidFill>
                   </a:tcPr>
                 </a:tc>
+                <a:extLst>
+                  <a:ext uri="{0D108BD9-81ED-4DB2-BD59-A6C34878D82A}">
+                    <a16:rowId xmlns:a16="http://schemas.microsoft.com/office/drawing/2014/main" val="10000"/>
+                  </a:ext>
+                </a:extLst>
               </a:tr>
               <a:tr h="490571">
                 <a:tc>
@@ -14838,7 +14773,7 @@
                     <a:p>
                       <a:pPr algn="ctr" latinLnBrk="1"/>
                       <a:r>
-                        <a:rPr lang="en-US" altLang="ko-KR" sz="1500" kern="1200" dirty="0" err="1" smtClean="0">
+                        <a:rPr lang="en-US" altLang="ko-KR" sz="1500" kern="1200" dirty="0" err="1">
                           <a:solidFill>
                             <a:schemeClr val="tx1"/>
                           </a:solidFill>
@@ -14849,7 +14784,7 @@
                         <a:t>sh_user_w_</a:t>
                       </a:r>
                       <a:r>
-                        <a:rPr lang="en-US" altLang="ko-KR" sz="1600" dirty="0" err="1" smtClean="0"/>
+                        <a:rPr lang="en-US" altLang="ko-KR" sz="1600" dirty="0" err="1"/>
                         <a:t>secession</a:t>
                       </a:r>
                       <a:endParaRPr lang="ko-KR" altLang="en-US" sz="1500" dirty="0">
@@ -14860,6 +14795,11 @@
                   </a:txBody>
                   <a:tcPr marL="121920" marR="121920" marT="60960" marB="60960" anchor="ctr"/>
                 </a:tc>
+                <a:extLst>
+                  <a:ext uri="{0D108BD9-81ED-4DB2-BD59-A6C34878D82A}">
+                    <a16:rowId xmlns:a16="http://schemas.microsoft.com/office/drawing/2014/main" val="10001"/>
+                  </a:ext>
+                </a:extLst>
               </a:tr>
             </a:tbl>
           </a:graphicData>
@@ -15086,7 +15026,7 @@
           <a:p>
             <a:pPr algn="ctr"/>
             <a:r>
-              <a:rPr lang="en-US" altLang="ko-KR" sz="1300" b="1" dirty="0" smtClean="0">
+              <a:rPr lang="en-US" altLang="ko-KR" sz="1300" b="1" dirty="0">
                 <a:solidFill>
                   <a:schemeClr val="bg1"/>
                 </a:solidFill>
@@ -15124,8 +15064,20 @@
             <a:tbl>
               <a:tblPr firstRow="1" bandRow="1"/>
               <a:tblGrid>
-                <a:gridCol w="280507"/>
-                <a:gridCol w="2407792"/>
+                <a:gridCol w="280507">
+                  <a:extLst>
+                    <a:ext uri="{9D8B030D-6E8A-4147-A177-3AD203B41FA5}">
+                      <a16:colId xmlns:a16="http://schemas.microsoft.com/office/drawing/2014/main" val="20000"/>
+                    </a:ext>
+                  </a:extLst>
+                </a:gridCol>
+                <a:gridCol w="2407792">
+                  <a:extLst>
+                    <a:ext uri="{9D8B030D-6E8A-4147-A177-3AD203B41FA5}">
+                      <a16:colId xmlns:a16="http://schemas.microsoft.com/office/drawing/2014/main" val="20001"/>
+                    </a:ext>
+                  </a:extLst>
+                </a:gridCol>
               </a:tblGrid>
               <a:tr h="469796">
                 <a:tc>
@@ -15139,7 +15091,7 @@
                         </a:lnSpc>
                       </a:pPr>
                       <a:r>
-                        <a:rPr lang="en-US" altLang="ko-KR" sz="1200" b="1" dirty="0" smtClean="0">
+                        <a:rPr lang="en-US" altLang="ko-KR" sz="1200" b="1" dirty="0">
                           <a:latin typeface="+mj-ea"/>
                           <a:ea typeface="+mj-ea"/>
                         </a:rPr>
@@ -15168,16 +15120,12 @@
                         </a:lnSpc>
                       </a:pPr>
                       <a:r>
-                        <a:rPr lang="ko-KR" altLang="en-US" sz="1200" b="1" dirty="0" smtClean="0">
+                        <a:rPr lang="ko-KR" altLang="en-US" sz="1200" b="1" dirty="0">
                           <a:latin typeface="+mj-ea"/>
                           <a:ea typeface="+mj-ea"/>
                         </a:rPr>
                         <a:t>기능</a:t>
                       </a:r>
-                      <a:endParaRPr lang="ko-KR" altLang="en-US" sz="1200" b="1" dirty="0">
-                        <a:latin typeface="+mj-ea"/>
-                        <a:ea typeface="+mj-ea"/>
-                      </a:endParaRPr>
                     </a:p>
                   </a:txBody>
                   <a:tcPr marL="121920" marR="121920" marT="60960" marB="60960" anchor="ctr">
@@ -15186,6 +15134,11 @@
                     </a:solidFill>
                   </a:tcPr>
                 </a:tc>
+                <a:extLst>
+                  <a:ext uri="{0D108BD9-81ED-4DB2-BD59-A6C34878D82A}">
+                    <a16:rowId xmlns:a16="http://schemas.microsoft.com/office/drawing/2014/main" val="10000"/>
+                  </a:ext>
+                </a:extLst>
               </a:tr>
               <a:tr h="620107">
                 <a:tc>
@@ -15199,7 +15152,7 @@
                         </a:lnSpc>
                       </a:pPr>
                       <a:r>
-                        <a:rPr lang="en-US" altLang="ko-KR" sz="1300" dirty="0" smtClean="0">
+                        <a:rPr lang="en-US" altLang="ko-KR" sz="1300" dirty="0">
                           <a:latin typeface="+mj-ea"/>
                           <a:ea typeface="+mj-ea"/>
                         </a:rPr>
@@ -15224,13 +15177,13 @@
                         </a:lnSpc>
                       </a:pPr>
                       <a:r>
-                        <a:rPr lang="ko-KR" altLang="en-US" sz="1200" b="1" dirty="0" smtClean="0">
+                        <a:rPr lang="ko-KR" altLang="en-US" sz="1200" b="1" dirty="0">
                           <a:latin typeface="+mj-ea"/>
                           <a:ea typeface="+mj-ea"/>
                         </a:rPr>
                         <a:t>탈퇴사유 선택</a:t>
                       </a:r>
-                      <a:endParaRPr lang="en-US" altLang="ko-KR" sz="1200" b="1" dirty="0" smtClean="0">
+                      <a:endParaRPr lang="en-US" altLang="ko-KR" sz="1200" b="1" dirty="0">
                         <a:latin typeface="+mj-ea"/>
                         <a:ea typeface="+mj-ea"/>
                       </a:endParaRPr>
@@ -15242,34 +15195,35 @@
                         </a:lnSpc>
                       </a:pPr>
                       <a:r>
-                        <a:rPr lang="en-US" altLang="ko-KR" sz="1200" dirty="0" smtClean="0">
+                        <a:rPr lang="en-US" altLang="ko-KR" sz="1200" dirty="0">
                           <a:latin typeface="+mj-ea"/>
                           <a:ea typeface="+mj-ea"/>
                         </a:rPr>
                         <a:t>- </a:t>
                       </a:r>
                       <a:r>
-                        <a:rPr lang="ko-KR" altLang="en-US" sz="1200" dirty="0" err="1" smtClean="0">
+                        <a:rPr lang="ko-KR" altLang="en-US" sz="1200" dirty="0" err="1">
                           <a:latin typeface="+mj-ea"/>
                           <a:ea typeface="+mj-ea"/>
                         </a:rPr>
                         <a:t>셀렉트</a:t>
                       </a:r>
                       <a:r>
-                        <a:rPr lang="ko-KR" altLang="en-US" sz="1200" dirty="0" smtClean="0">
+                        <a:rPr lang="ko-KR" altLang="en-US" sz="1200" dirty="0">
                           <a:latin typeface="+mj-ea"/>
                           <a:ea typeface="+mj-ea"/>
                         </a:rPr>
                         <a:t> 박스 선택</a:t>
                       </a:r>
-                      <a:endParaRPr lang="ko-KR" altLang="en-US" sz="1200" dirty="0">
-                        <a:latin typeface="+mj-ea"/>
-                        <a:ea typeface="+mj-ea"/>
-                      </a:endParaRPr>
                     </a:p>
                   </a:txBody>
                   <a:tcPr marL="121920" marR="121920" marT="60960" marB="60960"/>
                 </a:tc>
+                <a:extLst>
+                  <a:ext uri="{0D108BD9-81ED-4DB2-BD59-A6C34878D82A}">
+                    <a16:rowId xmlns:a16="http://schemas.microsoft.com/office/drawing/2014/main" val="10001"/>
+                  </a:ext>
+                </a:extLst>
               </a:tr>
               <a:tr h="620107">
                 <a:tc>
@@ -15283,7 +15237,7 @@
                         </a:lnSpc>
                       </a:pPr>
                       <a:r>
-                        <a:rPr lang="en-US" altLang="ko-KR" sz="1300" dirty="0" smtClean="0">
+                        <a:rPr lang="en-US" altLang="ko-KR" sz="1300" dirty="0">
                           <a:latin typeface="+mj-ea"/>
                           <a:ea typeface="+mj-ea"/>
                         </a:rPr>
@@ -15308,7 +15262,7 @@
                         </a:lnSpc>
                       </a:pPr>
                       <a:r>
-                        <a:rPr lang="ko-KR" altLang="en-US" sz="1200" b="1" i="0" u="none" strike="noStrike" cap="none" dirty="0" smtClean="0">
+                        <a:rPr lang="ko-KR" altLang="en-US" sz="1200" b="1" i="0" u="none" strike="noStrike" cap="none" dirty="0">
                           <a:solidFill>
                             <a:srgbClr val="000000"/>
                           </a:solidFill>
@@ -15319,7 +15273,7 @@
                         </a:rPr>
                         <a:t>본인 확인</a:t>
                       </a:r>
-                      <a:endParaRPr lang="en-US" altLang="ko-KR" sz="1200" b="1" i="0" u="none" strike="noStrike" cap="none" dirty="0" smtClean="0">
+                      <a:endParaRPr lang="en-US" altLang="ko-KR" sz="1200" b="1" i="0" u="none" strike="noStrike" cap="none" dirty="0">
                         <a:solidFill>
                           <a:srgbClr val="000000"/>
                         </a:solidFill>
@@ -15338,7 +15292,7 @@
                         <a:buChar char="-"/>
                       </a:pPr>
                       <a:r>
-                        <a:rPr lang="ko-KR" altLang="en-US" sz="1200" b="0" i="0" u="none" strike="noStrike" cap="none" dirty="0" err="1" smtClean="0">
+                        <a:rPr lang="ko-KR" altLang="en-US" sz="1200" b="0" i="0" u="none" strike="noStrike" cap="none" dirty="0" err="1">
                           <a:solidFill>
                             <a:srgbClr val="000000"/>
                           </a:solidFill>
@@ -15350,7 +15304,7 @@
                         <a:t>이메일</a:t>
                       </a:r>
                       <a:r>
-                        <a:rPr lang="ko-KR" altLang="en-US" sz="1200" b="0" i="0" u="none" strike="noStrike" cap="none" baseline="0" dirty="0" smtClean="0">
+                        <a:rPr lang="ko-KR" altLang="en-US" sz="1200" b="0" i="0" u="none" strike="noStrike" cap="none" baseline="0" dirty="0">
                           <a:solidFill>
                             <a:srgbClr val="000000"/>
                           </a:solidFill>
@@ -15361,7 +15315,7 @@
                         </a:rPr>
                         <a:t> 확인 메일 발송</a:t>
                       </a:r>
-                      <a:endParaRPr lang="en-US" altLang="ko-KR" sz="1200" b="0" i="0" u="none" strike="noStrike" cap="none" baseline="0" dirty="0" smtClean="0">
+                      <a:endParaRPr lang="en-US" altLang="ko-KR" sz="1200" b="0" i="0" u="none" strike="noStrike" cap="none" baseline="0" dirty="0">
                         <a:solidFill>
                           <a:srgbClr val="000000"/>
                         </a:solidFill>
@@ -15374,6 +15328,11 @@
                   </a:txBody>
                   <a:tcPr marL="121920" marR="121920" marT="60960" marB="60960"/>
                 </a:tc>
+                <a:extLst>
+                  <a:ext uri="{0D108BD9-81ED-4DB2-BD59-A6C34878D82A}">
+                    <a16:rowId xmlns:a16="http://schemas.microsoft.com/office/drawing/2014/main" val="10002"/>
+                  </a:ext>
+                </a:extLst>
               </a:tr>
             </a:tbl>
           </a:graphicData>
@@ -15447,13 +15406,6 @@
   <p:clrMapOvr>
     <a:masterClrMapping/>
   </p:clrMapOvr>
-  <p:timing>
-    <p:tnLst>
-      <p:par>
-        <p:cTn id="1" dur="indefinite" restart="never" nodeType="tmRoot"/>
-      </p:par>
-    </p:tnLst>
-  </p:timing>
 </p:sld>
 </file>
 
@@ -16346,7 +16298,7 @@
               <a:t>웹 </a:t>
             </a:r>
             <a:r>
-              <a:rPr lang="en-US" altLang="ko-KR" sz="2400" b="1" dirty="0" smtClean="0">
+              <a:rPr lang="en-US" altLang="ko-KR" sz="2400" b="1" dirty="0">
                 <a:solidFill>
                   <a:schemeClr val="tx1">
                     <a:lumMod val="75000"/>
@@ -16359,7 +16311,7 @@
               <a:t>– </a:t>
             </a:r>
             <a:r>
-              <a:rPr lang="ko-KR" altLang="en-US" sz="2400" b="1" dirty="0" err="1" smtClean="0">
+              <a:rPr lang="ko-KR" altLang="en-US" sz="2400" b="1" dirty="0" err="1">
                 <a:solidFill>
                   <a:schemeClr val="tx1">
                     <a:lumMod val="75000"/>
@@ -16372,7 +16324,7 @@
               <a:t>마이페이지</a:t>
             </a:r>
             <a:r>
-              <a:rPr lang="ko-KR" altLang="en-US" sz="2400" b="1" dirty="0" smtClean="0">
+              <a:rPr lang="ko-KR" altLang="en-US" sz="2400" b="1" dirty="0">
                 <a:solidFill>
                   <a:schemeClr val="tx1">
                     <a:lumMod val="75000"/>
@@ -16385,7 +16337,7 @@
               <a:t> </a:t>
             </a:r>
             <a:r>
-              <a:rPr lang="en-US" altLang="ko-KR" b="1" dirty="0" smtClean="0">
+              <a:rPr lang="en-US" altLang="ko-KR" b="1" dirty="0">
                 <a:solidFill>
                   <a:schemeClr val="tx1">
                     <a:lumMod val="75000"/>
@@ -16398,7 +16350,7 @@
               <a:t>– </a:t>
             </a:r>
             <a:r>
-              <a:rPr lang="ko-KR" altLang="en-US" b="1" dirty="0" smtClean="0">
+              <a:rPr lang="ko-KR" altLang="en-US" b="1" dirty="0">
                 <a:solidFill>
                   <a:schemeClr val="tx1">
                     <a:lumMod val="75000"/>
@@ -16410,16 +16362,6 @@
               </a:rPr>
               <a:t>나의 계좌</a:t>
             </a:r>
-            <a:endParaRPr lang="ko-KR" altLang="en-US" b="1" dirty="0">
-              <a:solidFill>
-                <a:schemeClr val="tx1">
-                  <a:lumMod val="75000"/>
-                  <a:lumOff val="25000"/>
-                </a:schemeClr>
-              </a:solidFill>
-              <a:latin typeface="+mj-ea"/>
-              <a:ea typeface="+mj-ea"/>
-            </a:endParaRPr>
           </a:p>
         </p:txBody>
       </p:sp>
@@ -16446,7 +16388,13 @@
             <a:tbl>
               <a:tblPr firstRow="1" bandRow="1"/>
               <a:tblGrid>
-                <a:gridCol w="2688299"/>
+                <a:gridCol w="2688299">
+                  <a:extLst>
+                    <a:ext uri="{9D8B030D-6E8A-4147-A177-3AD203B41FA5}">
+                      <a16:colId xmlns:a16="http://schemas.microsoft.com/office/drawing/2014/main" val="20000"/>
+                    </a:ext>
+                  </a:extLst>
+                </a:gridCol>
               </a:tblGrid>
               <a:tr h="424495">
                 <a:tc>
@@ -16456,7 +16404,7 @@
                     <a:p>
                       <a:pPr algn="ctr" latinLnBrk="1"/>
                       <a:r>
-                        <a:rPr lang="ko-KR" altLang="en-US" sz="1200" b="1" dirty="0" smtClean="0">
+                        <a:rPr lang="ko-KR" altLang="en-US" sz="1200" b="1" dirty="0">
                           <a:solidFill>
                             <a:schemeClr val="tx1"/>
                           </a:solidFill>
@@ -16465,13 +16413,6 @@
                         </a:rPr>
                         <a:t>화면코드</a:t>
                       </a:r>
-                      <a:endParaRPr lang="ko-KR" altLang="en-US" sz="1200" b="1" dirty="0">
-                        <a:solidFill>
-                          <a:schemeClr val="tx1"/>
-                        </a:solidFill>
-                        <a:latin typeface="+mj-ea"/>
-                        <a:ea typeface="+mj-ea"/>
-                      </a:endParaRPr>
                     </a:p>
                   </a:txBody>
                   <a:tcPr marL="121920" marR="121920" marT="60960" marB="60960" anchor="ctr">
@@ -16480,6 +16421,11 @@
                     </a:solidFill>
                   </a:tcPr>
                 </a:tc>
+                <a:extLst>
+                  <a:ext uri="{0D108BD9-81ED-4DB2-BD59-A6C34878D82A}">
+                    <a16:rowId xmlns:a16="http://schemas.microsoft.com/office/drawing/2014/main" val="10000"/>
+                  </a:ext>
+                </a:extLst>
               </a:tr>
               <a:tr h="490571">
                 <a:tc>
@@ -16489,7 +16435,7 @@
                     <a:p>
                       <a:pPr algn="ctr" latinLnBrk="1"/>
                       <a:r>
-                        <a:rPr lang="en-US" altLang="ko-KR" sz="1500" kern="1200" dirty="0" err="1" smtClean="0">
+                        <a:rPr lang="en-US" altLang="ko-KR" sz="1500" kern="1200" dirty="0" err="1">
                           <a:solidFill>
                             <a:schemeClr val="tx1"/>
                           </a:solidFill>
@@ -16507,6 +16453,11 @@
                   </a:txBody>
                   <a:tcPr marL="121920" marR="121920" marT="60960" marB="60960" anchor="ctr"/>
                 </a:tc>
+                <a:extLst>
+                  <a:ext uri="{0D108BD9-81ED-4DB2-BD59-A6C34878D82A}">
+                    <a16:rowId xmlns:a16="http://schemas.microsoft.com/office/drawing/2014/main" val="10001"/>
+                  </a:ext>
+                </a:extLst>
               </a:tr>
             </a:tbl>
           </a:graphicData>
@@ -16649,8 +16600,20 @@
             <a:tbl>
               <a:tblPr firstRow="1" bandRow="1"/>
               <a:tblGrid>
-                <a:gridCol w="280507"/>
-                <a:gridCol w="2407792"/>
+                <a:gridCol w="280507">
+                  <a:extLst>
+                    <a:ext uri="{9D8B030D-6E8A-4147-A177-3AD203B41FA5}">
+                      <a16:colId xmlns:a16="http://schemas.microsoft.com/office/drawing/2014/main" val="20000"/>
+                    </a:ext>
+                  </a:extLst>
+                </a:gridCol>
+                <a:gridCol w="2407792">
+                  <a:extLst>
+                    <a:ext uri="{9D8B030D-6E8A-4147-A177-3AD203B41FA5}">
+                      <a16:colId xmlns:a16="http://schemas.microsoft.com/office/drawing/2014/main" val="20001"/>
+                    </a:ext>
+                  </a:extLst>
+                </a:gridCol>
               </a:tblGrid>
               <a:tr h="469796">
                 <a:tc>
@@ -16664,7 +16627,7 @@
                         </a:lnSpc>
                       </a:pPr>
                       <a:r>
-                        <a:rPr lang="en-US" altLang="ko-KR" sz="1200" b="1" dirty="0" smtClean="0">
+                        <a:rPr lang="en-US" altLang="ko-KR" sz="1200" b="1" dirty="0">
                           <a:latin typeface="+mj-ea"/>
                           <a:ea typeface="+mj-ea"/>
                         </a:rPr>
@@ -16693,16 +16656,12 @@
                         </a:lnSpc>
                       </a:pPr>
                       <a:r>
-                        <a:rPr lang="ko-KR" altLang="en-US" sz="1200" b="1" dirty="0" smtClean="0">
+                        <a:rPr lang="ko-KR" altLang="en-US" sz="1200" b="1" dirty="0">
                           <a:latin typeface="+mj-ea"/>
                           <a:ea typeface="+mj-ea"/>
                         </a:rPr>
                         <a:t>기능</a:t>
                       </a:r>
-                      <a:endParaRPr lang="ko-KR" altLang="en-US" sz="1200" b="1" dirty="0">
-                        <a:latin typeface="+mj-ea"/>
-                        <a:ea typeface="+mj-ea"/>
-                      </a:endParaRPr>
                     </a:p>
                   </a:txBody>
                   <a:tcPr marL="121920" marR="121920" marT="60960" marB="60960" anchor="ctr">
@@ -16711,6 +16670,11 @@
                     </a:solidFill>
                   </a:tcPr>
                 </a:tc>
+                <a:extLst>
+                  <a:ext uri="{0D108BD9-81ED-4DB2-BD59-A6C34878D82A}">
+                    <a16:rowId xmlns:a16="http://schemas.microsoft.com/office/drawing/2014/main" val="10000"/>
+                  </a:ext>
+                </a:extLst>
               </a:tr>
               <a:tr h="620107">
                 <a:tc>
@@ -16724,7 +16688,7 @@
                         </a:lnSpc>
                       </a:pPr>
                       <a:r>
-                        <a:rPr lang="en-US" altLang="ko-KR" sz="1300" dirty="0" smtClean="0">
+                        <a:rPr lang="en-US" altLang="ko-KR" sz="1300" dirty="0">
                           <a:latin typeface="+mj-ea"/>
                           <a:ea typeface="+mj-ea"/>
                         </a:rPr>
@@ -16749,27 +16713,27 @@
                         </a:lnSpc>
                       </a:pPr>
                       <a:r>
-                        <a:rPr lang="ko-KR" altLang="en-US" sz="1200" b="1" dirty="0" smtClean="0">
+                        <a:rPr lang="ko-KR" altLang="en-US" sz="1200" b="1" dirty="0">
                           <a:latin typeface="+mj-ea"/>
                           <a:ea typeface="+mj-ea"/>
                         </a:rPr>
                         <a:t>계좌정보 등록</a:t>
                       </a:r>
                       <a:r>
-                        <a:rPr lang="en-US" altLang="ko-KR" sz="1200" b="1" dirty="0" smtClean="0">
+                        <a:rPr lang="en-US" altLang="ko-KR" sz="1200" b="1" dirty="0">
                           <a:latin typeface="+mj-ea"/>
                           <a:ea typeface="+mj-ea"/>
                         </a:rPr>
                         <a:t>/</a:t>
                       </a:r>
                       <a:r>
-                        <a:rPr lang="ko-KR" altLang="en-US" sz="1200" b="1" dirty="0" smtClean="0">
+                        <a:rPr lang="ko-KR" altLang="en-US" sz="1200" b="1" dirty="0">
                           <a:latin typeface="+mj-ea"/>
                           <a:ea typeface="+mj-ea"/>
                         </a:rPr>
                         <a:t>수정</a:t>
                       </a:r>
-                      <a:endParaRPr lang="en-US" altLang="ko-KR" sz="1200" b="1" dirty="0" smtClean="0">
+                      <a:endParaRPr lang="en-US" altLang="ko-KR" sz="1200" b="1" dirty="0">
                         <a:latin typeface="+mj-ea"/>
                         <a:ea typeface="+mj-ea"/>
                       </a:endParaRPr>
@@ -16777,6 +16741,11 @@
                   </a:txBody>
                   <a:tcPr marL="121920" marR="121920" marT="60960" marB="60960"/>
                 </a:tc>
+                <a:extLst>
+                  <a:ext uri="{0D108BD9-81ED-4DB2-BD59-A6C34878D82A}">
+                    <a16:rowId xmlns:a16="http://schemas.microsoft.com/office/drawing/2014/main" val="10001"/>
+                  </a:ext>
+                </a:extLst>
               </a:tr>
               <a:tr h="620107">
                 <a:tc>
@@ -16790,7 +16759,7 @@
                         </a:lnSpc>
                       </a:pPr>
                       <a:r>
-                        <a:rPr lang="en-US" altLang="ko-KR" sz="1300" dirty="0" smtClean="0">
+                        <a:rPr lang="en-US" altLang="ko-KR" sz="1300" dirty="0">
                           <a:latin typeface="+mj-ea"/>
                           <a:ea typeface="+mj-ea"/>
                         </a:rPr>
@@ -16815,7 +16784,7 @@
                         </a:lnSpc>
                       </a:pPr>
                       <a:r>
-                        <a:rPr lang="ko-KR" altLang="en-US" sz="1200" b="1" i="0" u="none" strike="noStrike" cap="none" dirty="0" smtClean="0">
+                        <a:rPr lang="ko-KR" altLang="en-US" sz="1200" b="1" i="0" u="none" strike="noStrike" cap="none" dirty="0">
                           <a:solidFill>
                             <a:srgbClr val="000000"/>
                           </a:solidFill>
@@ -16827,7 +16796,7 @@
                         <a:t>예치금</a:t>
                       </a:r>
                       <a:r>
-                        <a:rPr lang="ko-KR" altLang="en-US" sz="1200" b="1" i="0" u="none" strike="noStrike" cap="none" baseline="0" dirty="0" smtClean="0">
+                        <a:rPr lang="ko-KR" altLang="en-US" sz="1200" b="1" i="0" u="none" strike="noStrike" cap="none" baseline="0" dirty="0">
                           <a:solidFill>
                             <a:srgbClr val="000000"/>
                           </a:solidFill>
@@ -16838,7 +16807,7 @@
                         </a:rPr>
                         <a:t> 이용 내역</a:t>
                       </a:r>
-                      <a:endParaRPr lang="en-US" altLang="ko-KR" sz="1200" b="1" i="0" u="none" strike="noStrike" cap="none" dirty="0" smtClean="0">
+                      <a:endParaRPr lang="en-US" altLang="ko-KR" sz="1200" b="1" i="0" u="none" strike="noStrike" cap="none" dirty="0">
                         <a:solidFill>
                           <a:srgbClr val="000000"/>
                         </a:solidFill>
@@ -16857,7 +16826,7 @@
                         <a:buChar char="-"/>
                       </a:pPr>
                       <a:r>
-                        <a:rPr lang="ko-KR" altLang="en-US" sz="1200" b="0" i="0" u="none" strike="noStrike" cap="none" baseline="0" dirty="0" smtClean="0">
+                        <a:rPr lang="ko-KR" altLang="en-US" sz="1200" b="0" i="0" u="none" strike="noStrike" cap="none" baseline="0" dirty="0">
                           <a:solidFill>
                             <a:srgbClr val="000000"/>
                           </a:solidFill>
@@ -16869,7 +16838,7 @@
                         <a:t>주문</a:t>
                       </a:r>
                       <a:r>
-                        <a:rPr lang="en-US" altLang="ko-KR" sz="1200" b="0" i="0" u="none" strike="noStrike" cap="none" baseline="0" dirty="0" smtClean="0">
+                        <a:rPr lang="en-US" altLang="ko-KR" sz="1200" b="0" i="0" u="none" strike="noStrike" cap="none" baseline="0" dirty="0">
                           <a:solidFill>
                             <a:srgbClr val="000000"/>
                           </a:solidFill>
@@ -16881,7 +16850,7 @@
                         <a:t>, </a:t>
                       </a:r>
                       <a:r>
-                        <a:rPr lang="ko-KR" altLang="en-US" sz="1200" b="0" i="0" u="none" strike="noStrike" cap="none" baseline="0" dirty="0" smtClean="0">
+                        <a:rPr lang="ko-KR" altLang="en-US" sz="1200" b="0" i="0" u="none" strike="noStrike" cap="none" baseline="0" dirty="0">
                           <a:solidFill>
                             <a:srgbClr val="000000"/>
                           </a:solidFill>
@@ -16893,7 +16862,7 @@
                         <a:t>출금</a:t>
                       </a:r>
                       <a:r>
-                        <a:rPr lang="en-US" altLang="ko-KR" sz="1200" b="0" i="0" u="none" strike="noStrike" cap="none" baseline="0" dirty="0" smtClean="0">
+                        <a:rPr lang="en-US" altLang="ko-KR" sz="1200" b="0" i="0" u="none" strike="noStrike" cap="none" baseline="0" dirty="0">
                           <a:solidFill>
                             <a:srgbClr val="000000"/>
                           </a:solidFill>
@@ -16905,7 +16874,7 @@
                         <a:t>, </a:t>
                       </a:r>
                       <a:r>
-                        <a:rPr lang="ko-KR" altLang="en-US" sz="1200" b="0" i="0" u="none" strike="noStrike" cap="none" baseline="0" dirty="0" smtClean="0">
+                        <a:rPr lang="ko-KR" altLang="en-US" sz="1200" b="0" i="0" u="none" strike="noStrike" cap="none" baseline="0" dirty="0">
                           <a:solidFill>
                             <a:srgbClr val="000000"/>
                           </a:solidFill>
@@ -16917,7 +16886,7 @@
                         <a:t>입금</a:t>
                       </a:r>
                       <a:r>
-                        <a:rPr lang="en-US" altLang="ko-KR" sz="1200" b="0" i="0" u="none" strike="noStrike" cap="none" baseline="0" dirty="0" smtClean="0">
+                        <a:rPr lang="en-US" altLang="ko-KR" sz="1200" b="0" i="0" u="none" strike="noStrike" cap="none" baseline="0" dirty="0">
                           <a:solidFill>
                             <a:srgbClr val="000000"/>
                           </a:solidFill>
@@ -16929,7 +16898,7 @@
                         <a:t>, </a:t>
                       </a:r>
                       <a:r>
-                        <a:rPr lang="ko-KR" altLang="en-US" sz="1200" b="0" i="0" u="none" strike="noStrike" cap="none" baseline="0" dirty="0" err="1" smtClean="0">
+                        <a:rPr lang="ko-KR" altLang="en-US" sz="1200" b="0" i="0" u="none" strike="noStrike" cap="none" baseline="0" dirty="0" err="1">
                           <a:solidFill>
                             <a:srgbClr val="000000"/>
                           </a:solidFill>
@@ -16941,7 +16910,7 @@
                         <a:t>펀딩</a:t>
                       </a:r>
                       <a:r>
-                        <a:rPr lang="ko-KR" altLang="en-US" sz="1200" b="0" i="0" u="none" strike="noStrike" cap="none" baseline="0" dirty="0" smtClean="0">
+                        <a:rPr lang="ko-KR" altLang="en-US" sz="1200" b="0" i="0" u="none" strike="noStrike" cap="none" baseline="0" dirty="0">
                           <a:solidFill>
                             <a:srgbClr val="000000"/>
                           </a:solidFill>
@@ -16952,7 +16921,7 @@
                         </a:rPr>
                         <a:t> 분류</a:t>
                       </a:r>
-                      <a:endParaRPr lang="en-US" altLang="ko-KR" sz="1200" b="0" i="0" u="none" strike="noStrike" cap="none" baseline="0" dirty="0" smtClean="0">
+                      <a:endParaRPr lang="en-US" altLang="ko-KR" sz="1200" b="0" i="0" u="none" strike="noStrike" cap="none" baseline="0" dirty="0">
                         <a:solidFill>
                           <a:srgbClr val="000000"/>
                         </a:solidFill>
@@ -16965,6 +16934,11 @@
                   </a:txBody>
                   <a:tcPr marL="121920" marR="121920" marT="60960" marB="60960"/>
                 </a:tc>
+                <a:extLst>
+                  <a:ext uri="{0D108BD9-81ED-4DB2-BD59-A6C34878D82A}">
+                    <a16:rowId xmlns:a16="http://schemas.microsoft.com/office/drawing/2014/main" val="10002"/>
+                  </a:ext>
+                </a:extLst>
               </a:tr>
             </a:tbl>
           </a:graphicData>
@@ -17141,7 +17115,7 @@
           <a:p>
             <a:pPr algn="ctr"/>
             <a:r>
-              <a:rPr lang="en-US" altLang="ko-KR" sz="1300" b="1" dirty="0" smtClean="0">
+              <a:rPr lang="en-US" altLang="ko-KR" sz="1300" b="1" dirty="0">
                 <a:solidFill>
                   <a:schemeClr val="bg1"/>
                 </a:solidFill>
@@ -17480,13 +17454,6 @@
   <p:clrMapOvr>
     <a:masterClrMapping/>
   </p:clrMapOvr>
-  <p:timing>
-    <p:tnLst>
-      <p:par>
-        <p:cTn id="1" dur="indefinite" restart="never" nodeType="tmRoot"/>
-      </p:par>
-    </p:tnLst>
-  </p:timing>
 </p:sld>
 </file>
 
@@ -17745,7 +17712,7 @@
   <a:extraClrSchemeLst/>
   <a:extLst>
     <a:ext uri="{05A4C25C-085E-4340-85A3-A5531E510DB2}">
-      <thm15:themeFamily xmlns="" xmlns:thm15="http://schemas.microsoft.com/office/thememl/2012/main" name="Office Theme" id="{62F939B6-93AF-4DB8-9C6B-D6C7DFDC589F}" vid="{4A3C46E8-61CC-4603-A589-7422A47A8E4A}"/>
+      <thm15:themeFamily xmlns:thm15="http://schemas.microsoft.com/office/thememl/2012/main" name="Office Theme" id="{62F939B6-93AF-4DB8-9C6B-D6C7DFDC589F}" vid="{4A3C46E8-61CC-4603-A589-7422A47A8E4A}"/>
     </a:ext>
   </a:extLst>
 </a:theme>
@@ -18006,7 +17973,7 @@
   <a:extraClrSchemeLst/>
   <a:extLst>
     <a:ext uri="{05A4C25C-085E-4340-85A3-A5531E510DB2}">
-      <thm15:themeFamily xmlns="" xmlns:thm15="http://schemas.microsoft.com/office/thememl/2012/main" name="Office Theme" id="{62F939B6-93AF-4DB8-9C6B-D6C7DFDC589F}" vid="{4A3C46E8-61CC-4603-A589-7422A47A8E4A}"/>
+      <thm15:themeFamily xmlns:thm15="http://schemas.microsoft.com/office/thememl/2012/main" name="Office Theme" id="{62F939B6-93AF-4DB8-9C6B-D6C7DFDC589F}" vid="{4A3C46E8-61CC-4603-A589-7422A47A8E4A}"/>
     </a:ext>
   </a:extLst>
 </a:theme>

</xml_diff>